<commit_message>
finish documentation and add imagery
</commit_message>
<xml_diff>
--- a/Documentation/BuildingSketcherDiagrams.pptx
+++ b/Documentation/BuildingSketcherDiagrams.pptx
@@ -6,6 +6,8 @@
   </p:sldMasterIdLst>
   <p:sldIdLst>
     <p:sldId id="256" r:id="rId2"/>
+    <p:sldId id="257" r:id="rId3"/>
+    <p:sldId id="258" r:id="rId4"/>
   </p:sldIdLst>
   <p:sldSz cx="12192000" cy="6858000"/>
   <p:notesSz cx="6858000" cy="9144000"/>
@@ -104,6 +106,11 @@
       </a:defRPr>
     </a:lvl9pPr>
   </p:defaultTextStyle>
+  <p:extLst>
+    <p:ext uri="{EFAFB233-063F-42B5-8137-9DF3F51BA10A}">
+      <p15:sldGuideLst xmlns:p15="http://schemas.microsoft.com/office/powerpoint/2012/main"/>
+    </p:ext>
+  </p:extLst>
 </p:presentation>
 </file>
 
@@ -3344,10 +3351,10 @@
       </p:grpSpPr>
       <p:sp>
         <p:nvSpPr>
-          <p:cNvPr id="8" name="Téglalap 7">
-            <a:extLst>
-              <a:ext uri="{FF2B5EF4-FFF2-40B4-BE49-F238E27FC236}">
-                <a16:creationId xmlns:a16="http://schemas.microsoft.com/office/drawing/2014/main" id="{76675D16-A391-27F9-8D4D-D1D29BACF522}"/>
+          <p:cNvPr id="20" name="Téglalap 19">
+            <a:extLst>
+              <a:ext uri="{FF2B5EF4-FFF2-40B4-BE49-F238E27FC236}">
+                <a16:creationId xmlns:a16="http://schemas.microsoft.com/office/drawing/2014/main" id="{5602E445-83A2-42F1-33BC-95B676BE7BB0}"/>
               </a:ext>
             </a:extLst>
           </p:cNvPr>
@@ -3356,15 +3363,24 @@
         </p:nvSpPr>
         <p:spPr>
           <a:xfrm>
-            <a:off x="704088" y="384048"/>
-            <a:ext cx="1426464" cy="1481328"/>
+            <a:off x="475488" y="3338802"/>
+            <a:ext cx="9256978" cy="3343882"/>
           </a:xfrm>
           <a:prstGeom prst="rect">
             <a:avLst/>
           </a:prstGeom>
           <a:solidFill>
-            <a:schemeClr val="bg1"/>
+            <a:schemeClr val="accent2">
+              <a:lumMod val="40000"/>
+              <a:lumOff val="60000"/>
+            </a:schemeClr>
           </a:solidFill>
+          <a:ln>
+            <a:noFill/>
+          </a:ln>
+          <a:effectLst>
+            <a:softEdge rad="0"/>
+          </a:effectLst>
         </p:spPr>
         <p:style>
           <a:lnRef idx="2">
@@ -3393,6 +3409,55 @@
       </p:sp>
       <p:sp>
         <p:nvSpPr>
+          <p:cNvPr id="8" name="Téglalap 7">
+            <a:extLst>
+              <a:ext uri="{FF2B5EF4-FFF2-40B4-BE49-F238E27FC236}">
+                <a16:creationId xmlns:a16="http://schemas.microsoft.com/office/drawing/2014/main" id="{76675D16-A391-27F9-8D4D-D1D29BACF522}"/>
+              </a:ext>
+            </a:extLst>
+          </p:cNvPr>
+          <p:cNvSpPr/>
+          <p:nvPr/>
+        </p:nvSpPr>
+        <p:spPr>
+          <a:xfrm>
+            <a:off x="704088" y="384048"/>
+            <a:ext cx="1426464" cy="1481328"/>
+          </a:xfrm>
+          <a:prstGeom prst="rect">
+            <a:avLst/>
+          </a:prstGeom>
+          <a:solidFill>
+            <a:schemeClr val="bg1"/>
+          </a:solidFill>
+        </p:spPr>
+        <p:style>
+          <a:lnRef idx="2">
+            <a:schemeClr val="accent1">
+              <a:shade val="15000"/>
+            </a:schemeClr>
+          </a:lnRef>
+          <a:fillRef idx="1">
+            <a:schemeClr val="accent1"/>
+          </a:fillRef>
+          <a:effectRef idx="0">
+            <a:schemeClr val="accent1"/>
+          </a:effectRef>
+          <a:fontRef idx="minor">
+            <a:schemeClr val="lt1"/>
+          </a:fontRef>
+        </p:style>
+        <p:txBody>
+          <a:bodyPr rtlCol="0" anchor="ctr"/>
+          <a:lstStyle/>
+          <a:p>
+            <a:pPr algn="ctr"/>
+            <a:endParaRPr lang="en-US"/>
+          </a:p>
+        </p:txBody>
+      </p:sp>
+      <p:sp>
+        <p:nvSpPr>
           <p:cNvPr id="9" name="Szövegdoboz 8">
             <a:extLst>
               <a:ext uri="{FF2B5EF4-FFF2-40B4-BE49-F238E27FC236}">
@@ -3405,8 +3470,8 @@
         </p:nvSpPr>
         <p:spPr>
           <a:xfrm>
-            <a:off x="1067705" y="2066544"/>
-            <a:ext cx="699230" cy="369332"/>
+            <a:off x="534065" y="2009899"/>
+            <a:ext cx="1766509" cy="461665"/>
           </a:xfrm>
           <a:prstGeom prst="rect">
             <a:avLst/>
@@ -3420,10 +3485,26 @@
           <a:lstStyle/>
           <a:p>
             <a:r>
-              <a:rPr lang="en-US" dirty="0" err="1"/>
-              <a:t>papír</a:t>
-            </a:r>
-            <a:endParaRPr lang="en-US" dirty="0"/>
+              <a:rPr lang="en-US" sz="2400" dirty="0" err="1"/>
+              <a:t>Papír</a:t>
+            </a:r>
+            <a:r>
+              <a:rPr lang="en-US" sz="2400" dirty="0"/>
+              <a:t> </a:t>
+            </a:r>
+            <a:r>
+              <a:rPr lang="en-US" sz="2400" dirty="0" err="1"/>
+              <a:t>és</a:t>
+            </a:r>
+            <a:r>
+              <a:rPr lang="en-US" sz="2400" dirty="0"/>
+              <a:t> </a:t>
+            </a:r>
+            <a:r>
+              <a:rPr lang="en-US" sz="2400" dirty="0" err="1"/>
+              <a:t>rajz</a:t>
+            </a:r>
+            <a:endParaRPr lang="en-US" sz="2400" dirty="0"/>
           </a:p>
         </p:txBody>
       </p:sp>
@@ -3477,10 +3558,2941 @@
           </a:p>
         </p:txBody>
       </p:sp>
+      <p:sp>
+        <p:nvSpPr>
+          <p:cNvPr id="2" name="Téglalap 1">
+            <a:extLst>
+              <a:ext uri="{FF2B5EF4-FFF2-40B4-BE49-F238E27FC236}">
+                <a16:creationId xmlns:a16="http://schemas.microsoft.com/office/drawing/2014/main" id="{8ABCE559-F9C7-6B26-24E2-EBD1FCCDD791}"/>
+              </a:ext>
+            </a:extLst>
+          </p:cNvPr>
+          <p:cNvSpPr/>
+          <p:nvPr/>
+        </p:nvSpPr>
+        <p:spPr>
+          <a:xfrm rot="1370498">
+            <a:off x="1200695" y="809985"/>
+            <a:ext cx="334234" cy="773977"/>
+          </a:xfrm>
+          <a:prstGeom prst="rect">
+            <a:avLst/>
+          </a:prstGeom>
+          <a:noFill/>
+        </p:spPr>
+        <p:style>
+          <a:lnRef idx="2">
+            <a:schemeClr val="accent1">
+              <a:shade val="15000"/>
+            </a:schemeClr>
+          </a:lnRef>
+          <a:fillRef idx="1">
+            <a:schemeClr val="accent1"/>
+          </a:fillRef>
+          <a:effectRef idx="0">
+            <a:schemeClr val="accent1"/>
+          </a:effectRef>
+          <a:fontRef idx="minor">
+            <a:schemeClr val="lt1"/>
+          </a:fontRef>
+        </p:style>
+        <p:txBody>
+          <a:bodyPr rtlCol="0" anchor="ctr"/>
+          <a:lstStyle/>
+          <a:p>
+            <a:pPr algn="ctr"/>
+            <a:endParaRPr lang="en-US"/>
+          </a:p>
+        </p:txBody>
+      </p:sp>
+      <p:pic>
+        <p:nvPicPr>
+          <p:cNvPr id="1026" name="Picture 2" descr="OpenCV SVG and transparent PNG icons | TechIcons">
+            <a:extLst>
+              <a:ext uri="{FF2B5EF4-FFF2-40B4-BE49-F238E27FC236}">
+                <a16:creationId xmlns:a16="http://schemas.microsoft.com/office/drawing/2014/main" id="{659B1136-C7E9-650B-53A8-0C567CAA76DE}"/>
+              </a:ext>
+            </a:extLst>
+          </p:cNvPr>
+          <p:cNvPicPr>
+            <a:picLocks noChangeAspect="1" noChangeArrowheads="1"/>
+          </p:cNvPicPr>
+          <p:nvPr/>
+        </p:nvPicPr>
+        <p:blipFill>
+          <a:blip r:embed="rId2">
+            <a:extLst>
+              <a:ext uri="{28A0092B-C50C-407E-A947-70E740481C1C}">
+                <a14:useLocalDpi xmlns:a14="http://schemas.microsoft.com/office/drawing/2010/main" val="0"/>
+              </a:ext>
+            </a:extLst>
+          </a:blip>
+          <a:srcRect/>
+          <a:stretch>
+            <a:fillRect/>
+          </a:stretch>
+        </p:blipFill>
+        <p:spPr bwMode="auto">
+          <a:xfrm>
+            <a:off x="7183783" y="775459"/>
+            <a:ext cx="969970" cy="969970"/>
+          </a:xfrm>
+          <a:prstGeom prst="rect">
+            <a:avLst/>
+          </a:prstGeom>
+          <a:noFill/>
+          <a:extLst>
+            <a:ext uri="{909E8E84-426E-40DD-AFC4-6F175D3DCCD1}">
+              <a14:hiddenFill xmlns:a14="http://schemas.microsoft.com/office/drawing/2010/main">
+                <a:solidFill>
+                  <a:srgbClr val="FFFFFF"/>
+                </a:solidFill>
+              </a14:hiddenFill>
+            </a:ext>
+          </a:extLst>
+        </p:spPr>
+      </p:pic>
+      <p:pic>
+        <p:nvPicPr>
+          <p:cNvPr id="5" name="Ábra 4" descr="Rekesznyílás egyszínű kitöltéssel">
+            <a:extLst>
+              <a:ext uri="{FF2B5EF4-FFF2-40B4-BE49-F238E27FC236}">
+                <a16:creationId xmlns:a16="http://schemas.microsoft.com/office/drawing/2014/main" id="{3CD26CD7-3E17-2A68-A475-60DB7D04D81A}"/>
+              </a:ext>
+            </a:extLst>
+          </p:cNvPr>
+          <p:cNvPicPr>
+            <a:picLocks noChangeAspect="1"/>
+          </p:cNvPicPr>
+          <p:nvPr/>
+        </p:nvPicPr>
+        <p:blipFill>
+          <a:blip r:embed="rId3">
+            <a:extLst>
+              <a:ext uri="{96DAC541-7B7A-43D3-8B79-37D633B846F1}">
+                <asvg:svgBlip xmlns:asvg="http://schemas.microsoft.com/office/drawing/2016/SVG/main" r:embed="rId4"/>
+              </a:ext>
+            </a:extLst>
+          </a:blip>
+          <a:stretch>
+            <a:fillRect/>
+          </a:stretch>
+        </p:blipFill>
+        <p:spPr>
+          <a:xfrm>
+            <a:off x="2422616" y="619506"/>
+            <a:ext cx="867157" cy="867157"/>
+          </a:xfrm>
+          <a:prstGeom prst="rect">
+            <a:avLst/>
+          </a:prstGeom>
+        </p:spPr>
+      </p:pic>
+      <p:pic>
+        <p:nvPicPr>
+          <p:cNvPr id="1028" name="Picture 4">
+            <a:extLst>
+              <a:ext uri="{FF2B5EF4-FFF2-40B4-BE49-F238E27FC236}">
+                <a16:creationId xmlns:a16="http://schemas.microsoft.com/office/drawing/2014/main" id="{90711FF1-A65E-BF1D-C97D-9F0536E15F7E}"/>
+              </a:ext>
+            </a:extLst>
+          </p:cNvPr>
+          <p:cNvPicPr>
+            <a:picLocks noChangeAspect="1" noChangeArrowheads="1"/>
+          </p:cNvPicPr>
+          <p:nvPr/>
+        </p:nvPicPr>
+        <p:blipFill>
+          <a:blip r:embed="rId5">
+            <a:extLst>
+              <a:ext uri="{28A0092B-C50C-407E-A947-70E740481C1C}">
+                <a14:useLocalDpi xmlns:a14="http://schemas.microsoft.com/office/drawing/2010/main" val="0"/>
+              </a:ext>
+            </a:extLst>
+          </a:blip>
+          <a:srcRect/>
+          <a:stretch>
+            <a:fillRect/>
+          </a:stretch>
+        </p:blipFill>
+        <p:spPr bwMode="auto">
+          <a:xfrm>
+            <a:off x="3666040" y="1186362"/>
+            <a:ext cx="1815337" cy="660896"/>
+          </a:xfrm>
+          <a:prstGeom prst="rect">
+            <a:avLst/>
+          </a:prstGeom>
+          <a:noFill/>
+          <a:extLst>
+            <a:ext uri="{909E8E84-426E-40DD-AFC4-6F175D3DCCD1}">
+              <a14:hiddenFill xmlns:a14="http://schemas.microsoft.com/office/drawing/2010/main">
+                <a:solidFill>
+                  <a:srgbClr val="FFFFFF"/>
+                </a:solidFill>
+              </a14:hiddenFill>
+            </a:ext>
+          </a:extLst>
+        </p:spPr>
+      </p:pic>
+      <p:sp>
+        <p:nvSpPr>
+          <p:cNvPr id="6" name="Nyíl: szalag, balra mutató 5">
+            <a:extLst>
+              <a:ext uri="{FF2B5EF4-FFF2-40B4-BE49-F238E27FC236}">
+                <a16:creationId xmlns:a16="http://schemas.microsoft.com/office/drawing/2014/main" id="{D3C563C8-2491-1569-D5A5-9E53E51BB5D5}"/>
+              </a:ext>
+            </a:extLst>
+          </p:cNvPr>
+          <p:cNvSpPr/>
+          <p:nvPr/>
+        </p:nvSpPr>
+        <p:spPr>
+          <a:xfrm rot="16200000">
+            <a:off x="6153924" y="-269221"/>
+            <a:ext cx="595885" cy="2233834"/>
+          </a:xfrm>
+          <a:prstGeom prst="curvedLeftArrow">
+            <a:avLst/>
+          </a:prstGeom>
+        </p:spPr>
+        <p:style>
+          <a:lnRef idx="2">
+            <a:schemeClr val="accent2">
+              <a:shade val="15000"/>
+            </a:schemeClr>
+          </a:lnRef>
+          <a:fillRef idx="1">
+            <a:schemeClr val="accent2"/>
+          </a:fillRef>
+          <a:effectRef idx="0">
+            <a:schemeClr val="accent2"/>
+          </a:effectRef>
+          <a:fontRef idx="minor">
+            <a:schemeClr val="lt1"/>
+          </a:fontRef>
+        </p:style>
+        <p:txBody>
+          <a:bodyPr rtlCol="0" anchor="ctr"/>
+          <a:lstStyle/>
+          <a:p>
+            <a:pPr algn="ctr"/>
+            <a:endParaRPr lang="en-US">
+              <a:solidFill>
+                <a:schemeClr val="tx1"/>
+              </a:solidFill>
+            </a:endParaRPr>
+          </a:p>
+        </p:txBody>
+      </p:sp>
+      <p:sp>
+        <p:nvSpPr>
+          <p:cNvPr id="7" name="Szövegdoboz 6">
+            <a:extLst>
+              <a:ext uri="{FF2B5EF4-FFF2-40B4-BE49-F238E27FC236}">
+                <a16:creationId xmlns:a16="http://schemas.microsoft.com/office/drawing/2014/main" id="{DBDD9812-CE25-AC26-E0EF-CB7C0061F5E5}"/>
+              </a:ext>
+            </a:extLst>
+          </p:cNvPr>
+          <p:cNvSpPr txBox="1"/>
+          <p:nvPr/>
+        </p:nvSpPr>
+        <p:spPr>
+          <a:xfrm>
+            <a:off x="7982712" y="1640567"/>
+            <a:ext cx="591829" cy="369332"/>
+          </a:xfrm>
+          <a:prstGeom prst="rect">
+            <a:avLst/>
+          </a:prstGeom>
+          <a:noFill/>
+        </p:spPr>
+        <p:txBody>
+          <a:bodyPr wrap="none" rtlCol="0">
+            <a:spAutoFit/>
+          </a:bodyPr>
+          <a:lstStyle/>
+          <a:p>
+            <a:r>
+              <a:rPr lang="en-US" dirty="0"/>
+              <a:t>C++</a:t>
+            </a:r>
+          </a:p>
+        </p:txBody>
+      </p:sp>
+      <p:sp>
+        <p:nvSpPr>
+          <p:cNvPr id="11" name="Szövegdoboz 10">
+            <a:extLst>
+              <a:ext uri="{FF2B5EF4-FFF2-40B4-BE49-F238E27FC236}">
+                <a16:creationId xmlns:a16="http://schemas.microsoft.com/office/drawing/2014/main" id="{8B247AE6-CB38-1011-642B-5930170E37FB}"/>
+              </a:ext>
+            </a:extLst>
+          </p:cNvPr>
+          <p:cNvSpPr txBox="1"/>
+          <p:nvPr/>
+        </p:nvSpPr>
+        <p:spPr>
+          <a:xfrm>
+            <a:off x="5152643" y="155199"/>
+            <a:ext cx="2337771" cy="461665"/>
+          </a:xfrm>
+          <a:prstGeom prst="rect">
+            <a:avLst/>
+          </a:prstGeom>
+          <a:noFill/>
+        </p:spPr>
+        <p:txBody>
+          <a:bodyPr wrap="square" rtlCol="0">
+            <a:spAutoFit/>
+          </a:bodyPr>
+          <a:lstStyle/>
+          <a:p>
+            <a:r>
+              <a:rPr lang="en-US" sz="2400" dirty="0"/>
+              <a:t>.NET marshaller</a:t>
+            </a:r>
+          </a:p>
+        </p:txBody>
+      </p:sp>
+      <p:pic>
+        <p:nvPicPr>
+          <p:cNvPr id="13" name="Ábra 12" descr="Soldiázó nő egyszínű kitöltéssel">
+            <a:extLst>
+              <a:ext uri="{FF2B5EF4-FFF2-40B4-BE49-F238E27FC236}">
+                <a16:creationId xmlns:a16="http://schemas.microsoft.com/office/drawing/2014/main" id="{246F6B77-DE7E-B256-5E6D-B2D7F0D630FA}"/>
+              </a:ext>
+            </a:extLst>
+          </p:cNvPr>
+          <p:cNvPicPr>
+            <a:picLocks noChangeAspect="1"/>
+          </p:cNvPicPr>
+          <p:nvPr/>
+        </p:nvPicPr>
+        <p:blipFill>
+          <a:blip r:embed="rId6">
+            <a:extLst>
+              <a:ext uri="{96DAC541-7B7A-43D3-8B79-37D633B846F1}">
+                <asvg:svgBlip xmlns:asvg="http://schemas.microsoft.com/office/drawing/2016/SVG/main" r:embed="rId7"/>
+              </a:ext>
+            </a:extLst>
+          </a:blip>
+          <a:stretch>
+            <a:fillRect/>
+          </a:stretch>
+        </p:blipFill>
+        <p:spPr>
+          <a:xfrm>
+            <a:off x="6128857" y="646341"/>
+            <a:ext cx="469957" cy="469957"/>
+          </a:xfrm>
+          <a:prstGeom prst="rect">
+            <a:avLst/>
+          </a:prstGeom>
+        </p:spPr>
+      </p:pic>
+      <p:sp>
+        <p:nvSpPr>
+          <p:cNvPr id="14" name="Nyíl: szalag, balra mutató 13">
+            <a:extLst>
+              <a:ext uri="{FF2B5EF4-FFF2-40B4-BE49-F238E27FC236}">
+                <a16:creationId xmlns:a16="http://schemas.microsoft.com/office/drawing/2014/main" id="{B283BCCC-06B7-E2DA-9584-A42F67A70DE3}"/>
+              </a:ext>
+            </a:extLst>
+          </p:cNvPr>
+          <p:cNvSpPr/>
+          <p:nvPr/>
+        </p:nvSpPr>
+        <p:spPr>
+          <a:xfrm rot="16200000" flipH="1" flipV="1">
+            <a:off x="6000354" y="1099476"/>
+            <a:ext cx="735088" cy="2026994"/>
+          </a:xfrm>
+          <a:prstGeom prst="curvedLeftArrow">
+            <a:avLst/>
+          </a:prstGeom>
+        </p:spPr>
+        <p:style>
+          <a:lnRef idx="2">
+            <a:schemeClr val="accent2">
+              <a:shade val="15000"/>
+            </a:schemeClr>
+          </a:lnRef>
+          <a:fillRef idx="1">
+            <a:schemeClr val="accent2"/>
+          </a:fillRef>
+          <a:effectRef idx="0">
+            <a:schemeClr val="accent2"/>
+          </a:effectRef>
+          <a:fontRef idx="minor">
+            <a:schemeClr val="lt1"/>
+          </a:fontRef>
+        </p:style>
+        <p:txBody>
+          <a:bodyPr rtlCol="0" anchor="ctr"/>
+          <a:lstStyle/>
+          <a:p>
+            <a:pPr algn="ctr"/>
+            <a:endParaRPr lang="en-US">
+              <a:solidFill>
+                <a:schemeClr val="tx1"/>
+              </a:solidFill>
+            </a:endParaRPr>
+          </a:p>
+        </p:txBody>
+      </p:sp>
+      <p:pic>
+        <p:nvPicPr>
+          <p:cNvPr id="15" name="Ábra 14" descr="Soldiázó nő egyszínű kitöltéssel">
+            <a:extLst>
+              <a:ext uri="{FF2B5EF4-FFF2-40B4-BE49-F238E27FC236}">
+                <a16:creationId xmlns:a16="http://schemas.microsoft.com/office/drawing/2014/main" id="{4E4C25BD-C1A1-9D30-BB95-128DF04E2C76}"/>
+              </a:ext>
+            </a:extLst>
+          </p:cNvPr>
+          <p:cNvPicPr>
+            <a:picLocks noChangeAspect="1"/>
+          </p:cNvPicPr>
+          <p:nvPr/>
+        </p:nvPicPr>
+        <p:blipFill>
+          <a:blip r:embed="rId6">
+            <a:extLst>
+              <a:ext uri="{96DAC541-7B7A-43D3-8B79-37D633B846F1}">
+                <asvg:svgBlip xmlns:asvg="http://schemas.microsoft.com/office/drawing/2016/SVG/main" r:embed="rId7"/>
+              </a:ext>
+            </a:extLst>
+          </a:blip>
+          <a:stretch>
+            <a:fillRect/>
+          </a:stretch>
+        </p:blipFill>
+        <p:spPr>
+          <a:xfrm>
+            <a:off x="6128857" y="2001607"/>
+            <a:ext cx="469957" cy="469957"/>
+          </a:xfrm>
+          <a:prstGeom prst="rect">
+            <a:avLst/>
+          </a:prstGeom>
+        </p:spPr>
+      </p:pic>
+      <p:sp>
+        <p:nvSpPr>
+          <p:cNvPr id="16" name="Szövegdoboz 15">
+            <a:extLst>
+              <a:ext uri="{FF2B5EF4-FFF2-40B4-BE49-F238E27FC236}">
+                <a16:creationId xmlns:a16="http://schemas.microsoft.com/office/drawing/2014/main" id="{FC6969C9-09E2-96B8-15BC-80F4555BDEA3}"/>
+              </a:ext>
+            </a:extLst>
+          </p:cNvPr>
+          <p:cNvSpPr txBox="1"/>
+          <p:nvPr/>
+        </p:nvSpPr>
+        <p:spPr>
+          <a:xfrm>
+            <a:off x="8138008" y="881383"/>
+            <a:ext cx="1594457" cy="646331"/>
+          </a:xfrm>
+          <a:prstGeom prst="rect">
+            <a:avLst/>
+          </a:prstGeom>
+          <a:noFill/>
+        </p:spPr>
+        <p:txBody>
+          <a:bodyPr wrap="square" rtlCol="0">
+            <a:spAutoFit/>
+          </a:bodyPr>
+          <a:lstStyle/>
+          <a:p>
+            <a:r>
+              <a:rPr lang="en-US" dirty="0" err="1"/>
+              <a:t>Koordináta</a:t>
+            </a:r>
+            <a:r>
+              <a:rPr lang="en-US" dirty="0"/>
+              <a:t> </a:t>
+            </a:r>
+            <a:r>
+              <a:rPr lang="en-US" dirty="0" err="1"/>
+              <a:t>detektálás</a:t>
+            </a:r>
+            <a:endParaRPr lang="en-US" dirty="0"/>
+          </a:p>
+        </p:txBody>
+      </p:sp>
+      <p:sp>
+        <p:nvSpPr>
+          <p:cNvPr id="19" name="Háromszög 18">
+            <a:extLst>
+              <a:ext uri="{FF2B5EF4-FFF2-40B4-BE49-F238E27FC236}">
+                <a16:creationId xmlns:a16="http://schemas.microsoft.com/office/drawing/2014/main" id="{DA0AE9C8-0539-A394-A079-C582FEFBC69D}"/>
+              </a:ext>
+            </a:extLst>
+          </p:cNvPr>
+          <p:cNvSpPr/>
+          <p:nvPr/>
+        </p:nvSpPr>
+        <p:spPr>
+          <a:xfrm rot="316407">
+            <a:off x="3598617" y="1658723"/>
+            <a:ext cx="1476007" cy="1759534"/>
+          </a:xfrm>
+          <a:prstGeom prst="triangle">
+            <a:avLst/>
+          </a:prstGeom>
+          <a:solidFill>
+            <a:schemeClr val="accent2">
+              <a:lumMod val="40000"/>
+              <a:lumOff val="60000"/>
+            </a:schemeClr>
+          </a:solidFill>
+          <a:ln>
+            <a:noFill/>
+          </a:ln>
+        </p:spPr>
+        <p:style>
+          <a:lnRef idx="2">
+            <a:schemeClr val="accent1">
+              <a:shade val="15000"/>
+            </a:schemeClr>
+          </a:lnRef>
+          <a:fillRef idx="1">
+            <a:schemeClr val="accent1"/>
+          </a:fillRef>
+          <a:effectRef idx="0">
+            <a:schemeClr val="accent1"/>
+          </a:effectRef>
+          <a:fontRef idx="minor">
+            <a:schemeClr val="lt1"/>
+          </a:fontRef>
+        </p:style>
+        <p:txBody>
+          <a:bodyPr rtlCol="0" anchor="ctr"/>
+          <a:lstStyle/>
+          <a:p>
+            <a:pPr algn="ctr"/>
+            <a:endParaRPr lang="en-US"/>
+          </a:p>
+        </p:txBody>
+      </p:sp>
+      <p:sp>
+        <p:nvSpPr>
+          <p:cNvPr id="21" name="Téglalap 20">
+            <a:extLst>
+              <a:ext uri="{FF2B5EF4-FFF2-40B4-BE49-F238E27FC236}">
+                <a16:creationId xmlns:a16="http://schemas.microsoft.com/office/drawing/2014/main" id="{A8F53CE1-334A-6119-9029-84417A387AE4}"/>
+              </a:ext>
+            </a:extLst>
+          </p:cNvPr>
+          <p:cNvSpPr/>
+          <p:nvPr/>
+        </p:nvSpPr>
+        <p:spPr>
+          <a:xfrm>
+            <a:off x="1004989" y="3482363"/>
+            <a:ext cx="824659" cy="759551"/>
+          </a:xfrm>
+          <a:prstGeom prst="rect">
+            <a:avLst/>
+          </a:prstGeom>
+          <a:noFill/>
+        </p:spPr>
+        <p:style>
+          <a:lnRef idx="2">
+            <a:schemeClr val="accent1">
+              <a:shade val="15000"/>
+            </a:schemeClr>
+          </a:lnRef>
+          <a:fillRef idx="1">
+            <a:schemeClr val="accent1"/>
+          </a:fillRef>
+          <a:effectRef idx="0">
+            <a:schemeClr val="accent1"/>
+          </a:effectRef>
+          <a:fontRef idx="minor">
+            <a:schemeClr val="lt1"/>
+          </a:fontRef>
+        </p:style>
+        <p:txBody>
+          <a:bodyPr rtlCol="0" anchor="ctr"/>
+          <a:lstStyle/>
+          <a:p>
+            <a:pPr algn="ctr"/>
+            <a:endParaRPr lang="en-US"/>
+          </a:p>
+        </p:txBody>
+      </p:sp>
+      <p:pic>
+        <p:nvPicPr>
+          <p:cNvPr id="22" name="Ábra 21" descr="Soldiázó nő egyszínű kitöltéssel">
+            <a:extLst>
+              <a:ext uri="{FF2B5EF4-FFF2-40B4-BE49-F238E27FC236}">
+                <a16:creationId xmlns:a16="http://schemas.microsoft.com/office/drawing/2014/main" id="{B05929F8-7C51-FB2B-26AF-D66CAEA5CB90}"/>
+              </a:ext>
+            </a:extLst>
+          </p:cNvPr>
+          <p:cNvPicPr>
+            <a:picLocks noChangeAspect="1"/>
+          </p:cNvPicPr>
+          <p:nvPr/>
+        </p:nvPicPr>
+        <p:blipFill>
+          <a:blip r:embed="rId6">
+            <a:extLst>
+              <a:ext uri="{96DAC541-7B7A-43D3-8B79-37D633B846F1}">
+                <asvg:svgBlip xmlns:asvg="http://schemas.microsoft.com/office/drawing/2016/SVG/main" r:embed="rId7"/>
+              </a:ext>
+            </a:extLst>
+          </a:blip>
+          <a:stretch>
+            <a:fillRect/>
+          </a:stretch>
+        </p:blipFill>
+        <p:spPr>
+          <a:xfrm>
+            <a:off x="6281257" y="798741"/>
+            <a:ext cx="469957" cy="469957"/>
+          </a:xfrm>
+          <a:prstGeom prst="rect">
+            <a:avLst/>
+          </a:prstGeom>
+        </p:spPr>
+      </p:pic>
+      <p:sp>
+        <p:nvSpPr>
+          <p:cNvPr id="23" name="Szövegdoboz 22">
+            <a:extLst>
+              <a:ext uri="{FF2B5EF4-FFF2-40B4-BE49-F238E27FC236}">
+                <a16:creationId xmlns:a16="http://schemas.microsoft.com/office/drawing/2014/main" id="{D4F1E207-CADC-A563-51C9-D4FAEE1210D6}"/>
+              </a:ext>
+            </a:extLst>
+          </p:cNvPr>
+          <p:cNvSpPr txBox="1"/>
+          <p:nvPr/>
+        </p:nvSpPr>
+        <p:spPr>
+          <a:xfrm>
+            <a:off x="475487" y="4343820"/>
+            <a:ext cx="1896801" cy="461665"/>
+          </a:xfrm>
+          <a:prstGeom prst="rect">
+            <a:avLst/>
+          </a:prstGeom>
+          <a:noFill/>
+        </p:spPr>
+        <p:txBody>
+          <a:bodyPr wrap="none" rtlCol="0">
+            <a:spAutoFit/>
+          </a:bodyPr>
+          <a:lstStyle/>
+          <a:p>
+            <a:r>
+              <a:rPr lang="en-US" sz="2400" dirty="0" err="1"/>
+              <a:t>normalizálás</a:t>
+            </a:r>
+            <a:endParaRPr lang="en-US" sz="2400" dirty="0"/>
+          </a:p>
+        </p:txBody>
+      </p:sp>
+      <p:sp>
+        <p:nvSpPr>
+          <p:cNvPr id="26" name="Nyíl: jobbra mutató 25">
+            <a:extLst>
+              <a:ext uri="{FF2B5EF4-FFF2-40B4-BE49-F238E27FC236}">
+                <a16:creationId xmlns:a16="http://schemas.microsoft.com/office/drawing/2014/main" id="{D2E033B0-9BA2-2C68-0879-8AE6057E3C33}"/>
+              </a:ext>
+            </a:extLst>
+          </p:cNvPr>
+          <p:cNvSpPr/>
+          <p:nvPr/>
+        </p:nvSpPr>
+        <p:spPr>
+          <a:xfrm>
+            <a:off x="2254854" y="3758257"/>
+            <a:ext cx="2165450" cy="264722"/>
+          </a:xfrm>
+          <a:prstGeom prst="rightArrow">
+            <a:avLst/>
+          </a:prstGeom>
+          <a:solidFill>
+            <a:schemeClr val="accent2">
+              <a:lumMod val="75000"/>
+            </a:schemeClr>
+          </a:solidFill>
+        </p:spPr>
+        <p:style>
+          <a:lnRef idx="2">
+            <a:schemeClr val="accent1">
+              <a:shade val="15000"/>
+            </a:schemeClr>
+          </a:lnRef>
+          <a:fillRef idx="1">
+            <a:schemeClr val="accent1"/>
+          </a:fillRef>
+          <a:effectRef idx="0">
+            <a:schemeClr val="accent1"/>
+          </a:effectRef>
+          <a:fontRef idx="minor">
+            <a:schemeClr val="lt1"/>
+          </a:fontRef>
+        </p:style>
+        <p:txBody>
+          <a:bodyPr rtlCol="0" anchor="ctr"/>
+          <a:lstStyle/>
+          <a:p>
+            <a:pPr algn="ctr"/>
+            <a:endParaRPr lang="en-US"/>
+          </a:p>
+        </p:txBody>
+      </p:sp>
+      <p:pic>
+        <p:nvPicPr>
+          <p:cNvPr id="28" name="Ábra 27" descr="Kép egyszínű kitöltéssel">
+            <a:extLst>
+              <a:ext uri="{FF2B5EF4-FFF2-40B4-BE49-F238E27FC236}">
+                <a16:creationId xmlns:a16="http://schemas.microsoft.com/office/drawing/2014/main" id="{8920952F-2B72-C6D9-B76C-0351A554CFE2}"/>
+              </a:ext>
+            </a:extLst>
+          </p:cNvPr>
+          <p:cNvPicPr>
+            <a:picLocks noChangeAspect="1"/>
+          </p:cNvPicPr>
+          <p:nvPr/>
+        </p:nvPicPr>
+        <p:blipFill>
+          <a:blip r:embed="rId8">
+            <a:extLst>
+              <a:ext uri="{96DAC541-7B7A-43D3-8B79-37D633B846F1}">
+                <asvg:svgBlip xmlns:asvg="http://schemas.microsoft.com/office/drawing/2016/SVG/main" r:embed="rId9"/>
+              </a:ext>
+            </a:extLst>
+          </a:blip>
+          <a:stretch>
+            <a:fillRect/>
+          </a:stretch>
+        </p:blipFill>
+        <p:spPr>
+          <a:xfrm>
+            <a:off x="910612" y="4613494"/>
+            <a:ext cx="914400" cy="914400"/>
+          </a:xfrm>
+          <a:prstGeom prst="rect">
+            <a:avLst/>
+          </a:prstGeom>
+        </p:spPr>
+      </p:pic>
+      <p:pic>
+        <p:nvPicPr>
+          <p:cNvPr id="30" name="Ábra 29" descr="Hálózatdiagram egyszínű kitöltéssel">
+            <a:extLst>
+              <a:ext uri="{FF2B5EF4-FFF2-40B4-BE49-F238E27FC236}">
+                <a16:creationId xmlns:a16="http://schemas.microsoft.com/office/drawing/2014/main" id="{56AACDD7-79ED-DE83-477C-41C1A00A4C6C}"/>
+              </a:ext>
+            </a:extLst>
+          </p:cNvPr>
+          <p:cNvPicPr>
+            <a:picLocks noChangeAspect="1"/>
+          </p:cNvPicPr>
+          <p:nvPr/>
+        </p:nvPicPr>
+        <p:blipFill>
+          <a:blip r:embed="rId10">
+            <a:extLst>
+              <a:ext uri="{96DAC541-7B7A-43D3-8B79-37D633B846F1}">
+                <asvg:svgBlip xmlns:asvg="http://schemas.microsoft.com/office/drawing/2016/SVG/main" r:embed="rId11"/>
+              </a:ext>
+            </a:extLst>
+          </a:blip>
+          <a:stretch>
+            <a:fillRect/>
+          </a:stretch>
+        </p:blipFill>
+        <p:spPr>
+          <a:xfrm>
+            <a:off x="2985932" y="3928318"/>
+            <a:ext cx="824659" cy="824659"/>
+          </a:xfrm>
+          <a:prstGeom prst="rect">
+            <a:avLst/>
+          </a:prstGeom>
+        </p:spPr>
+      </p:pic>
+      <p:sp>
+        <p:nvSpPr>
+          <p:cNvPr id="31" name="Szövegdoboz 30">
+            <a:extLst>
+              <a:ext uri="{FF2B5EF4-FFF2-40B4-BE49-F238E27FC236}">
+                <a16:creationId xmlns:a16="http://schemas.microsoft.com/office/drawing/2014/main" id="{F38ED043-9178-3382-8C92-8984A8D4BE73}"/>
+              </a:ext>
+            </a:extLst>
+          </p:cNvPr>
+          <p:cNvSpPr txBox="1"/>
+          <p:nvPr/>
+        </p:nvSpPr>
+        <p:spPr>
+          <a:xfrm>
+            <a:off x="2345177" y="4650431"/>
+            <a:ext cx="1991443" cy="461665"/>
+          </a:xfrm>
+          <a:prstGeom prst="rect">
+            <a:avLst/>
+          </a:prstGeom>
+          <a:noFill/>
+        </p:spPr>
+        <p:txBody>
+          <a:bodyPr wrap="none" rtlCol="0">
+            <a:spAutoFit/>
+          </a:bodyPr>
+          <a:lstStyle/>
+          <a:p>
+            <a:r>
+              <a:rPr lang="en-US" sz="2400" dirty="0" err="1"/>
+              <a:t>DisplayMatrix</a:t>
+            </a:r>
+            <a:endParaRPr lang="en-US" sz="2400" dirty="0"/>
+          </a:p>
+        </p:txBody>
+      </p:sp>
+      <p:sp>
+        <p:nvSpPr>
+          <p:cNvPr id="32" name="Téglalap 31">
+            <a:extLst>
+              <a:ext uri="{FF2B5EF4-FFF2-40B4-BE49-F238E27FC236}">
+                <a16:creationId xmlns:a16="http://schemas.microsoft.com/office/drawing/2014/main" id="{849EE7EA-998F-70F5-36AF-94FA0920246B}"/>
+              </a:ext>
+            </a:extLst>
+          </p:cNvPr>
+          <p:cNvSpPr/>
+          <p:nvPr/>
+        </p:nvSpPr>
+        <p:spPr>
+          <a:xfrm>
+            <a:off x="4803027" y="3476480"/>
+            <a:ext cx="824659" cy="759551"/>
+          </a:xfrm>
+          <a:prstGeom prst="rect">
+            <a:avLst/>
+          </a:prstGeom>
+          <a:noFill/>
+        </p:spPr>
+        <p:style>
+          <a:lnRef idx="2">
+            <a:schemeClr val="accent1">
+              <a:shade val="15000"/>
+            </a:schemeClr>
+          </a:lnRef>
+          <a:fillRef idx="1">
+            <a:schemeClr val="accent1"/>
+          </a:fillRef>
+          <a:effectRef idx="0">
+            <a:schemeClr val="accent1"/>
+          </a:effectRef>
+          <a:fontRef idx="minor">
+            <a:schemeClr val="lt1"/>
+          </a:fontRef>
+        </p:style>
+        <p:txBody>
+          <a:bodyPr rtlCol="0" anchor="ctr"/>
+          <a:lstStyle/>
+          <a:p>
+            <a:pPr algn="ctr"/>
+            <a:endParaRPr lang="en-US"/>
+          </a:p>
+        </p:txBody>
+      </p:sp>
+      <p:pic>
+        <p:nvPicPr>
+          <p:cNvPr id="33" name="Picture 4">
+            <a:extLst>
+              <a:ext uri="{FF2B5EF4-FFF2-40B4-BE49-F238E27FC236}">
+                <a16:creationId xmlns:a16="http://schemas.microsoft.com/office/drawing/2014/main" id="{A5F6BB10-5F54-3DE9-E389-C3B6FC8ACF9C}"/>
+              </a:ext>
+            </a:extLst>
+          </p:cNvPr>
+          <p:cNvPicPr>
+            <a:picLocks noChangeAspect="1" noChangeArrowheads="1"/>
+          </p:cNvPicPr>
+          <p:nvPr/>
+        </p:nvPicPr>
+        <p:blipFill>
+          <a:blip r:embed="rId5">
+            <a:extLst>
+              <a:ext uri="{28A0092B-C50C-407E-A947-70E740481C1C}">
+                <a14:useLocalDpi xmlns:a14="http://schemas.microsoft.com/office/drawing/2010/main" val="0"/>
+              </a:ext>
+            </a:extLst>
+          </a:blip>
+          <a:srcRect/>
+          <a:stretch>
+            <a:fillRect/>
+          </a:stretch>
+        </p:blipFill>
+        <p:spPr bwMode="auto">
+          <a:xfrm>
+            <a:off x="4570314" y="4424773"/>
+            <a:ext cx="1148053" cy="417963"/>
+          </a:xfrm>
+          <a:prstGeom prst="rect">
+            <a:avLst/>
+          </a:prstGeom>
+          <a:noFill/>
+          <a:extLst>
+            <a:ext uri="{909E8E84-426E-40DD-AFC4-6F175D3DCCD1}">
+              <a14:hiddenFill xmlns:a14="http://schemas.microsoft.com/office/drawing/2010/main">
+                <a:solidFill>
+                  <a:srgbClr val="FFFFFF"/>
+                </a:solidFill>
+              </a14:hiddenFill>
+            </a:ext>
+          </a:extLst>
+        </p:spPr>
+      </p:pic>
+      <p:pic>
+        <p:nvPicPr>
+          <p:cNvPr id="34" name="Ábra 33" descr="Soldiázó nő egyszínű kitöltéssel">
+            <a:extLst>
+              <a:ext uri="{FF2B5EF4-FFF2-40B4-BE49-F238E27FC236}">
+                <a16:creationId xmlns:a16="http://schemas.microsoft.com/office/drawing/2014/main" id="{06C87F4E-D2BF-F99E-1477-CEBA28E0C8FF}"/>
+              </a:ext>
+            </a:extLst>
+          </p:cNvPr>
+          <p:cNvPicPr>
+            <a:picLocks noChangeAspect="1"/>
+          </p:cNvPicPr>
+          <p:nvPr/>
+        </p:nvPicPr>
+        <p:blipFill>
+          <a:blip r:embed="rId6">
+            <a:extLst>
+              <a:ext uri="{96DAC541-7B7A-43D3-8B79-37D633B846F1}">
+                <asvg:svgBlip xmlns:asvg="http://schemas.microsoft.com/office/drawing/2016/SVG/main" r:embed="rId7"/>
+              </a:ext>
+            </a:extLst>
+          </a:blip>
+          <a:stretch>
+            <a:fillRect/>
+          </a:stretch>
+        </p:blipFill>
+        <p:spPr>
+          <a:xfrm>
+            <a:off x="6281256" y="1957995"/>
+            <a:ext cx="469957" cy="469957"/>
+          </a:xfrm>
+          <a:prstGeom prst="rect">
+            <a:avLst/>
+          </a:prstGeom>
+        </p:spPr>
+      </p:pic>
+      <p:sp>
+        <p:nvSpPr>
+          <p:cNvPr id="35" name="Nyíl: jobbra mutató 34">
+            <a:extLst>
+              <a:ext uri="{FF2B5EF4-FFF2-40B4-BE49-F238E27FC236}">
+                <a16:creationId xmlns:a16="http://schemas.microsoft.com/office/drawing/2014/main" id="{8A0831BC-BBCD-F0F6-2AD1-046A6053F6AE}"/>
+              </a:ext>
+            </a:extLst>
+          </p:cNvPr>
+          <p:cNvSpPr/>
+          <p:nvPr/>
+        </p:nvSpPr>
+        <p:spPr>
+          <a:xfrm>
+            <a:off x="5817262" y="3707339"/>
+            <a:ext cx="2165450" cy="264722"/>
+          </a:xfrm>
+          <a:prstGeom prst="rightArrow">
+            <a:avLst/>
+          </a:prstGeom>
+          <a:solidFill>
+            <a:schemeClr val="accent2">
+              <a:lumMod val="75000"/>
+            </a:schemeClr>
+          </a:solidFill>
+        </p:spPr>
+        <p:style>
+          <a:lnRef idx="2">
+            <a:schemeClr val="accent1">
+              <a:shade val="15000"/>
+            </a:schemeClr>
+          </a:lnRef>
+          <a:fillRef idx="1">
+            <a:schemeClr val="accent1"/>
+          </a:fillRef>
+          <a:effectRef idx="0">
+            <a:schemeClr val="accent1"/>
+          </a:effectRef>
+          <a:fontRef idx="minor">
+            <a:schemeClr val="lt1"/>
+          </a:fontRef>
+        </p:style>
+        <p:txBody>
+          <a:bodyPr rtlCol="0" anchor="ctr"/>
+          <a:lstStyle/>
+          <a:p>
+            <a:pPr algn="ctr"/>
+            <a:endParaRPr lang="en-US"/>
+          </a:p>
+        </p:txBody>
+      </p:sp>
+      <p:pic>
+        <p:nvPicPr>
+          <p:cNvPr id="41" name="Ábra 40" descr="Szem egyszínű kitöltéssel">
+            <a:extLst>
+              <a:ext uri="{FF2B5EF4-FFF2-40B4-BE49-F238E27FC236}">
+                <a16:creationId xmlns:a16="http://schemas.microsoft.com/office/drawing/2014/main" id="{EF861E9B-A44E-5FCB-89F8-E50530CD2348}"/>
+              </a:ext>
+            </a:extLst>
+          </p:cNvPr>
+          <p:cNvPicPr>
+            <a:picLocks noChangeAspect="1"/>
+          </p:cNvPicPr>
+          <p:nvPr/>
+        </p:nvPicPr>
+        <p:blipFill>
+          <a:blip r:embed="rId12">
+            <a:extLst>
+              <a:ext uri="{96DAC541-7B7A-43D3-8B79-37D633B846F1}">
+                <asvg:svgBlip xmlns:asvg="http://schemas.microsoft.com/office/drawing/2016/SVG/main" r:embed="rId13"/>
+              </a:ext>
+            </a:extLst>
+          </a:blip>
+          <a:stretch>
+            <a:fillRect/>
+          </a:stretch>
+        </p:blipFill>
+        <p:spPr>
+          <a:xfrm>
+            <a:off x="6429490" y="4329349"/>
+            <a:ext cx="836976" cy="836976"/>
+          </a:xfrm>
+          <a:prstGeom prst="rect">
+            <a:avLst/>
+          </a:prstGeom>
+        </p:spPr>
+      </p:pic>
+      <p:cxnSp>
+        <p:nvCxnSpPr>
+          <p:cNvPr id="43" name="Egyenes összekötő nyíllal 42">
+            <a:extLst>
+              <a:ext uri="{FF2B5EF4-FFF2-40B4-BE49-F238E27FC236}">
+                <a16:creationId xmlns:a16="http://schemas.microsoft.com/office/drawing/2014/main" id="{2041240C-BBBC-E5B8-A495-C9E8AE087335}"/>
+              </a:ext>
+            </a:extLst>
+          </p:cNvPr>
+          <p:cNvCxnSpPr/>
+          <p:nvPr/>
+        </p:nvCxnSpPr>
+        <p:spPr>
+          <a:xfrm>
+            <a:off x="7028102" y="4881886"/>
+            <a:ext cx="1049457" cy="887873"/>
+          </a:xfrm>
+          <a:prstGeom prst="straightConnector1">
+            <a:avLst/>
+          </a:prstGeom>
+          <a:ln>
+            <a:tailEnd type="triangle"/>
+          </a:ln>
+        </p:spPr>
+        <p:style>
+          <a:lnRef idx="2">
+            <a:schemeClr val="accent1"/>
+          </a:lnRef>
+          <a:fillRef idx="0">
+            <a:schemeClr val="accent1"/>
+          </a:fillRef>
+          <a:effectRef idx="1">
+            <a:schemeClr val="accent1"/>
+          </a:effectRef>
+          <a:fontRef idx="minor">
+            <a:schemeClr val="tx1"/>
+          </a:fontRef>
+        </p:style>
+      </p:cxnSp>
+      <p:sp>
+        <p:nvSpPr>
+          <p:cNvPr id="45" name="Szövegdoboz 44">
+            <a:extLst>
+              <a:ext uri="{FF2B5EF4-FFF2-40B4-BE49-F238E27FC236}">
+                <a16:creationId xmlns:a16="http://schemas.microsoft.com/office/drawing/2014/main" id="{371558EA-8D36-51DC-2F82-5C9E92A7DFF3}"/>
+              </a:ext>
+            </a:extLst>
+          </p:cNvPr>
+          <p:cNvSpPr txBox="1"/>
+          <p:nvPr/>
+        </p:nvSpPr>
+        <p:spPr>
+          <a:xfrm>
+            <a:off x="5979176" y="3963108"/>
+            <a:ext cx="1781531" cy="461665"/>
+          </a:xfrm>
+          <a:prstGeom prst="rect">
+            <a:avLst/>
+          </a:prstGeom>
+          <a:noFill/>
+        </p:spPr>
+        <p:txBody>
+          <a:bodyPr wrap="square" rtlCol="0">
+            <a:spAutoFit/>
+          </a:bodyPr>
+          <a:lstStyle/>
+          <a:p>
+            <a:r>
+              <a:rPr lang="en-US" sz="2400" dirty="0" err="1"/>
+              <a:t>RayCasting</a:t>
+            </a:r>
+            <a:endParaRPr lang="en-US" sz="2400" dirty="0"/>
+          </a:p>
+        </p:txBody>
+      </p:sp>
+      <p:sp>
+        <p:nvSpPr>
+          <p:cNvPr id="46" name="Folyamatábra: Adatok 45">
+            <a:extLst>
+              <a:ext uri="{FF2B5EF4-FFF2-40B4-BE49-F238E27FC236}">
+                <a16:creationId xmlns:a16="http://schemas.microsoft.com/office/drawing/2014/main" id="{08C2CBF6-FD4A-FEAE-10D0-3FDD6E20D0FA}"/>
+              </a:ext>
+            </a:extLst>
+          </p:cNvPr>
+          <p:cNvSpPr/>
+          <p:nvPr/>
+        </p:nvSpPr>
+        <p:spPr>
+          <a:xfrm>
+            <a:off x="8066475" y="3987336"/>
+            <a:ext cx="1223026" cy="224485"/>
+          </a:xfrm>
+          <a:prstGeom prst="flowChartInputOutput">
+            <a:avLst/>
+          </a:prstGeom>
+          <a:solidFill>
+            <a:schemeClr val="accent2">
+              <a:lumMod val="60000"/>
+              <a:lumOff val="40000"/>
+            </a:schemeClr>
+          </a:solidFill>
+        </p:spPr>
+        <p:style>
+          <a:lnRef idx="2">
+            <a:schemeClr val="accent1">
+              <a:shade val="15000"/>
+            </a:schemeClr>
+          </a:lnRef>
+          <a:fillRef idx="1">
+            <a:schemeClr val="accent1"/>
+          </a:fillRef>
+          <a:effectRef idx="0">
+            <a:schemeClr val="accent1"/>
+          </a:effectRef>
+          <a:fontRef idx="minor">
+            <a:schemeClr val="lt1"/>
+          </a:fontRef>
+        </p:style>
+        <p:txBody>
+          <a:bodyPr rtlCol="0" anchor="ctr"/>
+          <a:lstStyle/>
+          <a:p>
+            <a:pPr algn="ctr"/>
+            <a:endParaRPr lang="en-US"/>
+          </a:p>
+        </p:txBody>
+      </p:sp>
+      <p:pic>
+        <p:nvPicPr>
+          <p:cNvPr id="48" name="Ábra 47" descr="Kocka egyszínű kitöltéssel">
+            <a:extLst>
+              <a:ext uri="{FF2B5EF4-FFF2-40B4-BE49-F238E27FC236}">
+                <a16:creationId xmlns:a16="http://schemas.microsoft.com/office/drawing/2014/main" id="{1F475477-3D06-07B9-EFE9-1D1D5AB397B9}"/>
+              </a:ext>
+            </a:extLst>
+          </p:cNvPr>
+          <p:cNvPicPr>
+            <a:picLocks noChangeAspect="1"/>
+          </p:cNvPicPr>
+          <p:nvPr/>
+        </p:nvPicPr>
+        <p:blipFill>
+          <a:blip r:embed="rId14">
+            <a:extLst>
+              <a:ext uri="{96DAC541-7B7A-43D3-8B79-37D633B846F1}">
+                <asvg:svgBlip xmlns:asvg="http://schemas.microsoft.com/office/drawing/2016/SVG/main" r:embed="rId15"/>
+              </a:ext>
+            </a:extLst>
+          </a:blip>
+          <a:stretch>
+            <a:fillRect/>
+          </a:stretch>
+        </p:blipFill>
+        <p:spPr>
+          <a:xfrm>
+            <a:off x="8321787" y="3549392"/>
+            <a:ext cx="735155" cy="735155"/>
+          </a:xfrm>
+          <a:prstGeom prst="rect">
+            <a:avLst/>
+          </a:prstGeom>
+        </p:spPr>
+      </p:pic>
     </p:spTree>
     <p:extLst>
       <p:ext uri="{BB962C8B-B14F-4D97-AF65-F5344CB8AC3E}">
         <p14:creationId xmlns:p14="http://schemas.microsoft.com/office/powerpoint/2010/main" val="727267502"/>
+      </p:ext>
+    </p:extLst>
+  </p:cSld>
+  <p:clrMapOvr>
+    <a:masterClrMapping/>
+  </p:clrMapOvr>
+</p:sld>
+</file>
+
+<file path=ppt/slides/slide2.xml><?xml version="1.0" encoding="utf-8"?>
+<p:sld xmlns:a="http://schemas.openxmlformats.org/drawingml/2006/main" xmlns:r="http://schemas.openxmlformats.org/officeDocument/2006/relationships" xmlns:p="http://schemas.openxmlformats.org/presentationml/2006/main">
+  <p:cSld>
+    <p:spTree>
+      <p:nvGrpSpPr>
+        <p:cNvPr id="1" name=""/>
+        <p:cNvGrpSpPr/>
+        <p:nvPr/>
+      </p:nvGrpSpPr>
+      <p:grpSpPr>
+        <a:xfrm>
+          <a:off x="0" y="0"/>
+          <a:ext cx="0" cy="0"/>
+          <a:chOff x="0" y="0"/>
+          <a:chExt cx="0" cy="0"/>
+        </a:xfrm>
+      </p:grpSpPr>
+      <p:pic>
+        <p:nvPicPr>
+          <p:cNvPr id="3" name="Ábra 2" descr="Kép egyszínű kitöltéssel">
+            <a:extLst>
+              <a:ext uri="{FF2B5EF4-FFF2-40B4-BE49-F238E27FC236}">
+                <a16:creationId xmlns:a16="http://schemas.microsoft.com/office/drawing/2014/main" id="{068785A3-C9B5-493F-AFB7-2C13ED8CFFCD}"/>
+              </a:ext>
+            </a:extLst>
+          </p:cNvPr>
+          <p:cNvPicPr>
+            <a:picLocks noChangeAspect="1"/>
+          </p:cNvPicPr>
+          <p:nvPr/>
+        </p:nvPicPr>
+        <p:blipFill>
+          <a:blip r:embed="rId2">
+            <a:extLst>
+              <a:ext uri="{96DAC541-7B7A-43D3-8B79-37D633B846F1}">
+                <asvg:svgBlip xmlns:asvg="http://schemas.microsoft.com/office/drawing/2016/SVG/main" r:embed="rId3"/>
+              </a:ext>
+            </a:extLst>
+          </a:blip>
+          <a:stretch>
+            <a:fillRect/>
+          </a:stretch>
+        </p:blipFill>
+        <p:spPr>
+          <a:xfrm>
+            <a:off x="2253544" y="1738555"/>
+            <a:ext cx="914400" cy="914400"/>
+          </a:xfrm>
+          <a:prstGeom prst="rect">
+            <a:avLst/>
+          </a:prstGeom>
+        </p:spPr>
+      </p:pic>
+      <p:sp>
+        <p:nvSpPr>
+          <p:cNvPr id="5" name="Nyíl: jobbra mutató 4">
+            <a:extLst>
+              <a:ext uri="{FF2B5EF4-FFF2-40B4-BE49-F238E27FC236}">
+                <a16:creationId xmlns:a16="http://schemas.microsoft.com/office/drawing/2014/main" id="{9D899C41-8C83-A3C2-2AE9-496B7AF2BA2E}"/>
+              </a:ext>
+            </a:extLst>
+          </p:cNvPr>
+          <p:cNvSpPr/>
+          <p:nvPr/>
+        </p:nvSpPr>
+        <p:spPr>
+          <a:xfrm>
+            <a:off x="3344347" y="2104315"/>
+            <a:ext cx="548640" cy="182880"/>
+          </a:xfrm>
+          <a:prstGeom prst="rightArrow">
+            <a:avLst/>
+          </a:prstGeom>
+          <a:solidFill>
+            <a:schemeClr val="bg2">
+              <a:lumMod val="90000"/>
+            </a:schemeClr>
+          </a:solidFill>
+        </p:spPr>
+        <p:style>
+          <a:lnRef idx="2">
+            <a:schemeClr val="accent1">
+              <a:shade val="15000"/>
+            </a:schemeClr>
+          </a:lnRef>
+          <a:fillRef idx="1">
+            <a:schemeClr val="accent1"/>
+          </a:fillRef>
+          <a:effectRef idx="0">
+            <a:schemeClr val="accent1"/>
+          </a:effectRef>
+          <a:fontRef idx="minor">
+            <a:schemeClr val="lt1"/>
+          </a:fontRef>
+        </p:style>
+        <p:txBody>
+          <a:bodyPr rtlCol="0" anchor="ctr"/>
+          <a:lstStyle/>
+          <a:p>
+            <a:pPr algn="ctr"/>
+            <a:endParaRPr lang="en-US"/>
+          </a:p>
+        </p:txBody>
+      </p:sp>
+      <p:pic>
+        <p:nvPicPr>
+          <p:cNvPr id="6" name="Ábra 5" descr="Kép egyszínű kitöltéssel">
+            <a:extLst>
+              <a:ext uri="{FF2B5EF4-FFF2-40B4-BE49-F238E27FC236}">
+                <a16:creationId xmlns:a16="http://schemas.microsoft.com/office/drawing/2014/main" id="{630191E9-7BBD-8005-7E72-F6DF22253B30}"/>
+              </a:ext>
+            </a:extLst>
+          </p:cNvPr>
+          <p:cNvPicPr>
+            <a:picLocks noChangeAspect="1"/>
+          </p:cNvPicPr>
+          <p:nvPr/>
+        </p:nvPicPr>
+        <p:blipFill>
+          <a:blip r:embed="rId4">
+            <a:extLst>
+              <a:ext uri="{96DAC541-7B7A-43D3-8B79-37D633B846F1}">
+                <asvg:svgBlip xmlns:asvg="http://schemas.microsoft.com/office/drawing/2016/SVG/main" r:embed="rId5"/>
+              </a:ext>
+            </a:extLst>
+          </a:blip>
+          <a:stretch>
+            <a:fillRect/>
+          </a:stretch>
+        </p:blipFill>
+        <p:spPr>
+          <a:xfrm>
+            <a:off x="3969568" y="1738555"/>
+            <a:ext cx="914400" cy="914400"/>
+          </a:xfrm>
+          <a:prstGeom prst="rect">
+            <a:avLst/>
+          </a:prstGeom>
+        </p:spPr>
+      </p:pic>
+      <p:sp>
+        <p:nvSpPr>
+          <p:cNvPr id="7" name="Nyíl: jobbra mutató 6">
+            <a:extLst>
+              <a:ext uri="{FF2B5EF4-FFF2-40B4-BE49-F238E27FC236}">
+                <a16:creationId xmlns:a16="http://schemas.microsoft.com/office/drawing/2014/main" id="{7C1EEFB3-2321-D528-3E3A-67CEC383C805}"/>
+              </a:ext>
+            </a:extLst>
+          </p:cNvPr>
+          <p:cNvSpPr/>
+          <p:nvPr/>
+        </p:nvSpPr>
+        <p:spPr>
+          <a:xfrm>
+            <a:off x="4978837" y="2104315"/>
+            <a:ext cx="548640" cy="182880"/>
+          </a:xfrm>
+          <a:prstGeom prst="rightArrow">
+            <a:avLst/>
+          </a:prstGeom>
+          <a:solidFill>
+            <a:schemeClr val="bg2">
+              <a:lumMod val="90000"/>
+            </a:schemeClr>
+          </a:solidFill>
+        </p:spPr>
+        <p:style>
+          <a:lnRef idx="2">
+            <a:schemeClr val="accent1">
+              <a:shade val="15000"/>
+            </a:schemeClr>
+          </a:lnRef>
+          <a:fillRef idx="1">
+            <a:schemeClr val="accent1"/>
+          </a:fillRef>
+          <a:effectRef idx="0">
+            <a:schemeClr val="accent1"/>
+          </a:effectRef>
+          <a:fontRef idx="minor">
+            <a:schemeClr val="lt1"/>
+          </a:fontRef>
+        </p:style>
+        <p:txBody>
+          <a:bodyPr rtlCol="0" anchor="ctr"/>
+          <a:lstStyle/>
+          <a:p>
+            <a:pPr algn="ctr"/>
+            <a:endParaRPr lang="en-US"/>
+          </a:p>
+        </p:txBody>
+      </p:sp>
+      <p:pic>
+        <p:nvPicPr>
+          <p:cNvPr id="8" name="Ábra 7" descr="Kép egyszínű kitöltéssel">
+            <a:extLst>
+              <a:ext uri="{FF2B5EF4-FFF2-40B4-BE49-F238E27FC236}">
+                <a16:creationId xmlns:a16="http://schemas.microsoft.com/office/drawing/2014/main" id="{C06D7705-E2E4-09AF-C840-A9129E4F3FAB}"/>
+              </a:ext>
+            </a:extLst>
+          </p:cNvPr>
+          <p:cNvPicPr>
+            <a:picLocks noChangeAspect="1"/>
+          </p:cNvPicPr>
+          <p:nvPr/>
+        </p:nvPicPr>
+        <p:blipFill>
+          <a:blip r:embed="rId6">
+            <a:lum bright="10000" contrast="24000"/>
+            <a:alphaModFix amt="93000"/>
+            <a:extLst>
+              <a:ext uri="{96DAC541-7B7A-43D3-8B79-37D633B846F1}">
+                <asvg:svgBlip xmlns:asvg="http://schemas.microsoft.com/office/drawing/2016/SVG/main" r:embed="rId7"/>
+              </a:ext>
+            </a:extLst>
+          </a:blip>
+          <a:stretch>
+            <a:fillRect/>
+          </a:stretch>
+        </p:blipFill>
+        <p:spPr>
+          <a:xfrm>
+            <a:off x="5685592" y="1738555"/>
+            <a:ext cx="914400" cy="914400"/>
+          </a:xfrm>
+          <a:prstGeom prst="rect">
+            <a:avLst/>
+          </a:prstGeom>
+          <a:effectLst>
+            <a:softEdge rad="25400"/>
+          </a:effectLst>
+        </p:spPr>
+      </p:pic>
+      <p:sp>
+        <p:nvSpPr>
+          <p:cNvPr id="14" name="Nyíl: jobbra mutató 13">
+            <a:extLst>
+              <a:ext uri="{FF2B5EF4-FFF2-40B4-BE49-F238E27FC236}">
+                <a16:creationId xmlns:a16="http://schemas.microsoft.com/office/drawing/2014/main" id="{6956AF65-A5BC-E954-8340-9FBF5F5364EB}"/>
+              </a:ext>
+            </a:extLst>
+          </p:cNvPr>
+          <p:cNvSpPr/>
+          <p:nvPr/>
+        </p:nvSpPr>
+        <p:spPr>
+          <a:xfrm>
+            <a:off x="6714343" y="2104315"/>
+            <a:ext cx="548640" cy="182880"/>
+          </a:xfrm>
+          <a:prstGeom prst="rightArrow">
+            <a:avLst/>
+          </a:prstGeom>
+          <a:solidFill>
+            <a:schemeClr val="bg2">
+              <a:lumMod val="90000"/>
+            </a:schemeClr>
+          </a:solidFill>
+        </p:spPr>
+        <p:style>
+          <a:lnRef idx="2">
+            <a:schemeClr val="accent1">
+              <a:shade val="15000"/>
+            </a:schemeClr>
+          </a:lnRef>
+          <a:fillRef idx="1">
+            <a:schemeClr val="accent1"/>
+          </a:fillRef>
+          <a:effectRef idx="0">
+            <a:schemeClr val="accent1"/>
+          </a:effectRef>
+          <a:fontRef idx="minor">
+            <a:schemeClr val="lt1"/>
+          </a:fontRef>
+        </p:style>
+        <p:txBody>
+          <a:bodyPr rtlCol="0" anchor="ctr"/>
+          <a:lstStyle/>
+          <a:p>
+            <a:pPr algn="ctr"/>
+            <a:endParaRPr lang="en-US"/>
+          </a:p>
+        </p:txBody>
+      </p:sp>
+      <p:pic>
+        <p:nvPicPr>
+          <p:cNvPr id="15" name="Ábra 14" descr="Kép egyszínű kitöltéssel">
+            <a:extLst>
+              <a:ext uri="{FF2B5EF4-FFF2-40B4-BE49-F238E27FC236}">
+                <a16:creationId xmlns:a16="http://schemas.microsoft.com/office/drawing/2014/main" id="{7907B911-9608-D370-CAA5-C6F381AE3B97}"/>
+              </a:ext>
+            </a:extLst>
+          </p:cNvPr>
+          <p:cNvPicPr>
+            <a:picLocks noChangeAspect="1"/>
+          </p:cNvPicPr>
+          <p:nvPr/>
+        </p:nvPicPr>
+        <p:blipFill>
+          <a:blip r:embed="rId6">
+            <a:lum bright="10000" contrast="24000"/>
+            <a:alphaModFix amt="93000"/>
+            <a:extLst>
+              <a:ext uri="{96DAC541-7B7A-43D3-8B79-37D633B846F1}">
+                <asvg:svgBlip xmlns:asvg="http://schemas.microsoft.com/office/drawing/2016/SVG/main" r:embed="rId7"/>
+              </a:ext>
+            </a:extLst>
+          </a:blip>
+          <a:stretch>
+            <a:fillRect/>
+          </a:stretch>
+        </p:blipFill>
+        <p:spPr>
+          <a:xfrm>
+            <a:off x="7377334" y="1738555"/>
+            <a:ext cx="914400" cy="914400"/>
+          </a:xfrm>
+          <a:prstGeom prst="rect">
+            <a:avLst/>
+          </a:prstGeom>
+          <a:effectLst>
+            <a:softEdge rad="25400"/>
+          </a:effectLst>
+        </p:spPr>
+      </p:pic>
+      <p:cxnSp>
+        <p:nvCxnSpPr>
+          <p:cNvPr id="17" name="Egyenes összekötő 16">
+            <a:extLst>
+              <a:ext uri="{FF2B5EF4-FFF2-40B4-BE49-F238E27FC236}">
+                <a16:creationId xmlns:a16="http://schemas.microsoft.com/office/drawing/2014/main" id="{BBECA599-2778-48DF-942C-996ECB11379B}"/>
+              </a:ext>
+            </a:extLst>
+          </p:cNvPr>
+          <p:cNvCxnSpPr/>
+          <p:nvPr/>
+        </p:nvCxnSpPr>
+        <p:spPr>
+          <a:xfrm>
+            <a:off x="8181523" y="1423087"/>
+            <a:ext cx="0" cy="1545336"/>
+          </a:xfrm>
+          <a:prstGeom prst="line">
+            <a:avLst/>
+          </a:prstGeom>
+        </p:spPr>
+        <p:style>
+          <a:lnRef idx="2">
+            <a:schemeClr val="accent1"/>
+          </a:lnRef>
+          <a:fillRef idx="0">
+            <a:schemeClr val="accent1"/>
+          </a:fillRef>
+          <a:effectRef idx="1">
+            <a:schemeClr val="accent1"/>
+          </a:effectRef>
+          <a:fontRef idx="minor">
+            <a:schemeClr val="tx1"/>
+          </a:fontRef>
+        </p:style>
+      </p:cxnSp>
+      <p:cxnSp>
+        <p:nvCxnSpPr>
+          <p:cNvPr id="18" name="Egyenes összekötő 17">
+            <a:extLst>
+              <a:ext uri="{FF2B5EF4-FFF2-40B4-BE49-F238E27FC236}">
+                <a16:creationId xmlns:a16="http://schemas.microsoft.com/office/drawing/2014/main" id="{140D544A-E193-D3F3-9330-5FEF66E9F673}"/>
+              </a:ext>
+            </a:extLst>
+          </p:cNvPr>
+          <p:cNvCxnSpPr>
+            <a:cxnSpLocks/>
+          </p:cNvCxnSpPr>
+          <p:nvPr/>
+        </p:nvCxnSpPr>
+        <p:spPr>
+          <a:xfrm flipH="1">
+            <a:off x="7277252" y="1520242"/>
+            <a:ext cx="680071" cy="1351026"/>
+          </a:xfrm>
+          <a:prstGeom prst="line">
+            <a:avLst/>
+          </a:prstGeom>
+        </p:spPr>
+        <p:style>
+          <a:lnRef idx="2">
+            <a:schemeClr val="accent1"/>
+          </a:lnRef>
+          <a:fillRef idx="0">
+            <a:schemeClr val="accent1"/>
+          </a:fillRef>
+          <a:effectRef idx="1">
+            <a:schemeClr val="accent1"/>
+          </a:effectRef>
+          <a:fontRef idx="minor">
+            <a:schemeClr val="tx1"/>
+          </a:fontRef>
+        </p:style>
+      </p:cxnSp>
+      <p:sp>
+        <p:nvSpPr>
+          <p:cNvPr id="21" name="Nyíl: jobbra mutató 20">
+            <a:extLst>
+              <a:ext uri="{FF2B5EF4-FFF2-40B4-BE49-F238E27FC236}">
+                <a16:creationId xmlns:a16="http://schemas.microsoft.com/office/drawing/2014/main" id="{1FCFE14F-F19C-1F0C-0E42-3C991AC9B310}"/>
+              </a:ext>
+            </a:extLst>
+          </p:cNvPr>
+          <p:cNvSpPr/>
+          <p:nvPr/>
+        </p:nvSpPr>
+        <p:spPr>
+          <a:xfrm rot="5400000">
+            <a:off x="7591563" y="3151303"/>
+            <a:ext cx="548640" cy="182880"/>
+          </a:xfrm>
+          <a:prstGeom prst="rightArrow">
+            <a:avLst/>
+          </a:prstGeom>
+          <a:solidFill>
+            <a:schemeClr val="bg2">
+              <a:lumMod val="90000"/>
+            </a:schemeClr>
+          </a:solidFill>
+        </p:spPr>
+        <p:style>
+          <a:lnRef idx="2">
+            <a:schemeClr val="accent1">
+              <a:shade val="15000"/>
+            </a:schemeClr>
+          </a:lnRef>
+          <a:fillRef idx="1">
+            <a:schemeClr val="accent1"/>
+          </a:fillRef>
+          <a:effectRef idx="0">
+            <a:schemeClr val="accent1"/>
+          </a:effectRef>
+          <a:fontRef idx="minor">
+            <a:schemeClr val="lt1"/>
+          </a:fontRef>
+        </p:style>
+        <p:txBody>
+          <a:bodyPr rtlCol="0" anchor="ctr"/>
+          <a:lstStyle/>
+          <a:p>
+            <a:pPr algn="ctr"/>
+            <a:endParaRPr lang="en-US"/>
+          </a:p>
+        </p:txBody>
+      </p:sp>
+      <p:pic>
+        <p:nvPicPr>
+          <p:cNvPr id="24" name="Ábra 23" descr="Kép körvonalas">
+            <a:extLst>
+              <a:ext uri="{FF2B5EF4-FFF2-40B4-BE49-F238E27FC236}">
+                <a16:creationId xmlns:a16="http://schemas.microsoft.com/office/drawing/2014/main" id="{A0B48766-55CB-8042-1BC4-9595C44206F4}"/>
+              </a:ext>
+            </a:extLst>
+          </p:cNvPr>
+          <p:cNvPicPr>
+            <a:picLocks noChangeAspect="1"/>
+          </p:cNvPicPr>
+          <p:nvPr/>
+        </p:nvPicPr>
+        <p:blipFill>
+          <a:blip r:embed="rId8">
+            <a:extLst>
+              <a:ext uri="{96DAC541-7B7A-43D3-8B79-37D633B846F1}">
+                <asvg:svgBlip xmlns:asvg="http://schemas.microsoft.com/office/drawing/2016/SVG/main" r:embed="rId9"/>
+              </a:ext>
+            </a:extLst>
+          </a:blip>
+          <a:stretch>
+            <a:fillRect/>
+          </a:stretch>
+        </p:blipFill>
+        <p:spPr>
+          <a:xfrm>
+            <a:off x="7377334" y="3517063"/>
+            <a:ext cx="914400" cy="914400"/>
+          </a:xfrm>
+          <a:prstGeom prst="rect">
+            <a:avLst/>
+          </a:prstGeom>
+        </p:spPr>
+      </p:pic>
+      <p:sp>
+        <p:nvSpPr>
+          <p:cNvPr id="25" name="Nyíl: jobbra mutató 24">
+            <a:extLst>
+              <a:ext uri="{FF2B5EF4-FFF2-40B4-BE49-F238E27FC236}">
+                <a16:creationId xmlns:a16="http://schemas.microsoft.com/office/drawing/2014/main" id="{A4792C6B-5F89-CA9E-5D5C-F11544F85865}"/>
+              </a:ext>
+            </a:extLst>
+          </p:cNvPr>
+          <p:cNvSpPr/>
+          <p:nvPr/>
+        </p:nvSpPr>
+        <p:spPr>
+          <a:xfrm rot="10800000">
+            <a:off x="6714343" y="3882823"/>
+            <a:ext cx="548640" cy="182880"/>
+          </a:xfrm>
+          <a:prstGeom prst="rightArrow">
+            <a:avLst/>
+          </a:prstGeom>
+          <a:solidFill>
+            <a:schemeClr val="bg2">
+              <a:lumMod val="90000"/>
+            </a:schemeClr>
+          </a:solidFill>
+        </p:spPr>
+        <p:style>
+          <a:lnRef idx="2">
+            <a:schemeClr val="accent1">
+              <a:shade val="15000"/>
+            </a:schemeClr>
+          </a:lnRef>
+          <a:fillRef idx="1">
+            <a:schemeClr val="accent1"/>
+          </a:fillRef>
+          <a:effectRef idx="0">
+            <a:schemeClr val="accent1"/>
+          </a:effectRef>
+          <a:fontRef idx="minor">
+            <a:schemeClr val="lt1"/>
+          </a:fontRef>
+        </p:style>
+        <p:txBody>
+          <a:bodyPr rtlCol="0" anchor="ctr"/>
+          <a:lstStyle/>
+          <a:p>
+            <a:pPr algn="ctr"/>
+            <a:endParaRPr lang="en-US"/>
+          </a:p>
+        </p:txBody>
+      </p:sp>
+      <p:sp>
+        <p:nvSpPr>
+          <p:cNvPr id="26" name="Szövegdoboz 25">
+            <a:extLst>
+              <a:ext uri="{FF2B5EF4-FFF2-40B4-BE49-F238E27FC236}">
+                <a16:creationId xmlns:a16="http://schemas.microsoft.com/office/drawing/2014/main" id="{3A635C0D-1FD6-4A13-1521-1B35FE401675}"/>
+              </a:ext>
+            </a:extLst>
+          </p:cNvPr>
+          <p:cNvSpPr txBox="1"/>
+          <p:nvPr/>
+        </p:nvSpPr>
+        <p:spPr>
+          <a:xfrm>
+            <a:off x="3892987" y="2557086"/>
+            <a:ext cx="1022331" cy="338554"/>
+          </a:xfrm>
+          <a:prstGeom prst="rect">
+            <a:avLst/>
+          </a:prstGeom>
+          <a:noFill/>
+        </p:spPr>
+        <p:txBody>
+          <a:bodyPr wrap="none" rtlCol="0">
+            <a:spAutoFit/>
+          </a:bodyPr>
+          <a:lstStyle/>
+          <a:p>
+            <a:r>
+              <a:rPr lang="en-US" sz="1600" dirty="0"/>
+              <a:t>grayscale</a:t>
+            </a:r>
+          </a:p>
+        </p:txBody>
+      </p:sp>
+      <p:sp>
+        <p:nvSpPr>
+          <p:cNvPr id="27" name="Szövegdoboz 26">
+            <a:extLst>
+              <a:ext uri="{FF2B5EF4-FFF2-40B4-BE49-F238E27FC236}">
+                <a16:creationId xmlns:a16="http://schemas.microsoft.com/office/drawing/2014/main" id="{0DC66122-C18B-0A89-5DED-6F0549C32A3E}"/>
+              </a:ext>
+            </a:extLst>
+          </p:cNvPr>
+          <p:cNvSpPr txBox="1"/>
+          <p:nvPr/>
+        </p:nvSpPr>
+        <p:spPr>
+          <a:xfrm>
+            <a:off x="5754437" y="2629869"/>
+            <a:ext cx="537327" cy="338554"/>
+          </a:xfrm>
+          <a:prstGeom prst="rect">
+            <a:avLst/>
+          </a:prstGeom>
+          <a:noFill/>
+        </p:spPr>
+        <p:txBody>
+          <a:bodyPr wrap="none" rtlCol="0">
+            <a:spAutoFit/>
+          </a:bodyPr>
+          <a:lstStyle/>
+          <a:p>
+            <a:r>
+              <a:rPr lang="en-US" sz="1600" dirty="0"/>
+              <a:t>blur</a:t>
+            </a:r>
+          </a:p>
+        </p:txBody>
+      </p:sp>
+      <p:sp>
+        <p:nvSpPr>
+          <p:cNvPr id="28" name="Szövegdoboz 27">
+            <a:extLst>
+              <a:ext uri="{FF2B5EF4-FFF2-40B4-BE49-F238E27FC236}">
+                <a16:creationId xmlns:a16="http://schemas.microsoft.com/office/drawing/2014/main" id="{933D0A2B-B096-C496-9332-B084780DEDDC}"/>
+              </a:ext>
+            </a:extLst>
+          </p:cNvPr>
+          <p:cNvSpPr txBox="1"/>
+          <p:nvPr/>
+        </p:nvSpPr>
+        <p:spPr>
+          <a:xfrm>
+            <a:off x="8405484" y="2026478"/>
+            <a:ext cx="1506246" cy="338554"/>
+          </a:xfrm>
+          <a:prstGeom prst="rect">
+            <a:avLst/>
+          </a:prstGeom>
+          <a:noFill/>
+        </p:spPr>
+        <p:txBody>
+          <a:bodyPr wrap="none" rtlCol="0">
+            <a:spAutoFit/>
+          </a:bodyPr>
+          <a:lstStyle/>
+          <a:p>
+            <a:r>
+              <a:rPr lang="en-US" sz="1600" dirty="0"/>
+              <a:t>Edge detection</a:t>
+            </a:r>
+          </a:p>
+        </p:txBody>
+      </p:sp>
+      <p:sp>
+        <p:nvSpPr>
+          <p:cNvPr id="29" name="Szövegdoboz 28">
+            <a:extLst>
+              <a:ext uri="{FF2B5EF4-FFF2-40B4-BE49-F238E27FC236}">
+                <a16:creationId xmlns:a16="http://schemas.microsoft.com/office/drawing/2014/main" id="{5A268F0B-0768-BBB4-6B6F-D662EAF9AF76}"/>
+              </a:ext>
+            </a:extLst>
+          </p:cNvPr>
+          <p:cNvSpPr txBox="1"/>
+          <p:nvPr/>
+        </p:nvSpPr>
+        <p:spPr>
+          <a:xfrm>
+            <a:off x="8291734" y="3804985"/>
+            <a:ext cx="1804853" cy="338554"/>
+          </a:xfrm>
+          <a:prstGeom prst="rect">
+            <a:avLst/>
+          </a:prstGeom>
+          <a:noFill/>
+        </p:spPr>
+        <p:txBody>
+          <a:bodyPr wrap="none" rtlCol="0">
+            <a:spAutoFit/>
+          </a:bodyPr>
+          <a:lstStyle/>
+          <a:p>
+            <a:r>
+              <a:rPr lang="en-US" sz="1600" dirty="0"/>
+              <a:t>Contour detection</a:t>
+            </a:r>
+          </a:p>
+        </p:txBody>
+      </p:sp>
+      <p:sp>
+        <p:nvSpPr>
+          <p:cNvPr id="30" name="Téglalap 29">
+            <a:extLst>
+              <a:ext uri="{FF2B5EF4-FFF2-40B4-BE49-F238E27FC236}">
+                <a16:creationId xmlns:a16="http://schemas.microsoft.com/office/drawing/2014/main" id="{C9EB6865-60DC-0DC0-0A33-35DEEF1056A3}"/>
+              </a:ext>
+            </a:extLst>
+          </p:cNvPr>
+          <p:cNvSpPr/>
+          <p:nvPr/>
+        </p:nvSpPr>
+        <p:spPr>
+          <a:xfrm>
+            <a:off x="5868788" y="3615611"/>
+            <a:ext cx="448400" cy="717301"/>
+          </a:xfrm>
+          <a:prstGeom prst="rect">
+            <a:avLst/>
+          </a:prstGeom>
+        </p:spPr>
+        <p:style>
+          <a:lnRef idx="2">
+            <a:schemeClr val="accent1">
+              <a:shade val="15000"/>
+            </a:schemeClr>
+          </a:lnRef>
+          <a:fillRef idx="1">
+            <a:schemeClr val="accent1"/>
+          </a:fillRef>
+          <a:effectRef idx="0">
+            <a:schemeClr val="accent1"/>
+          </a:effectRef>
+          <a:fontRef idx="minor">
+            <a:schemeClr val="lt1"/>
+          </a:fontRef>
+        </p:style>
+        <p:txBody>
+          <a:bodyPr rtlCol="0" anchor="ctr"/>
+          <a:lstStyle/>
+          <a:p>
+            <a:pPr algn="ctr"/>
+            <a:endParaRPr lang="en-US"/>
+          </a:p>
+        </p:txBody>
+      </p:sp>
+      <p:sp>
+        <p:nvSpPr>
+          <p:cNvPr id="32" name="Szövegdoboz 31">
+            <a:extLst>
+              <a:ext uri="{FF2B5EF4-FFF2-40B4-BE49-F238E27FC236}">
+                <a16:creationId xmlns:a16="http://schemas.microsoft.com/office/drawing/2014/main" id="{7496B92A-CA4B-8386-A7FA-CB4B5A5A584A}"/>
+              </a:ext>
+            </a:extLst>
+          </p:cNvPr>
+          <p:cNvSpPr txBox="1"/>
+          <p:nvPr/>
+        </p:nvSpPr>
+        <p:spPr>
+          <a:xfrm>
+            <a:off x="5282312" y="4383216"/>
+            <a:ext cx="1958418" cy="646331"/>
+          </a:xfrm>
+          <a:prstGeom prst="rect">
+            <a:avLst/>
+          </a:prstGeom>
+          <a:noFill/>
+        </p:spPr>
+        <p:txBody>
+          <a:bodyPr wrap="square">
+            <a:spAutoFit/>
+          </a:bodyPr>
+          <a:lstStyle/>
+          <a:p>
+            <a:r>
+              <a:rPr lang="en-US" dirty="0"/>
+              <a:t>Find the paper-like one</a:t>
+            </a:r>
+            <a:endParaRPr lang="en-US" sz="1800" dirty="0"/>
+          </a:p>
+        </p:txBody>
+      </p:sp>
+      <p:sp>
+        <p:nvSpPr>
+          <p:cNvPr id="33" name="Nyíl: jobbra mutató 32">
+            <a:extLst>
+              <a:ext uri="{FF2B5EF4-FFF2-40B4-BE49-F238E27FC236}">
+                <a16:creationId xmlns:a16="http://schemas.microsoft.com/office/drawing/2014/main" id="{551C9A35-FDDD-C48B-C5CF-4ED7549F2846}"/>
+              </a:ext>
+            </a:extLst>
+          </p:cNvPr>
+          <p:cNvSpPr/>
+          <p:nvPr/>
+        </p:nvSpPr>
+        <p:spPr>
+          <a:xfrm rot="10800000">
+            <a:off x="4588628" y="3882823"/>
+            <a:ext cx="548640" cy="182880"/>
+          </a:xfrm>
+          <a:prstGeom prst="rightArrow">
+            <a:avLst/>
+          </a:prstGeom>
+          <a:solidFill>
+            <a:schemeClr val="bg2">
+              <a:lumMod val="90000"/>
+            </a:schemeClr>
+          </a:solidFill>
+        </p:spPr>
+        <p:style>
+          <a:lnRef idx="2">
+            <a:schemeClr val="accent1">
+              <a:shade val="15000"/>
+            </a:schemeClr>
+          </a:lnRef>
+          <a:fillRef idx="1">
+            <a:schemeClr val="accent1"/>
+          </a:fillRef>
+          <a:effectRef idx="0">
+            <a:schemeClr val="accent1"/>
+          </a:effectRef>
+          <a:fontRef idx="minor">
+            <a:schemeClr val="lt1"/>
+          </a:fontRef>
+        </p:style>
+        <p:txBody>
+          <a:bodyPr rtlCol="0" anchor="ctr"/>
+          <a:lstStyle/>
+          <a:p>
+            <a:pPr algn="ctr"/>
+            <a:endParaRPr lang="en-US"/>
+          </a:p>
+        </p:txBody>
+      </p:sp>
+      <p:pic>
+        <p:nvPicPr>
+          <p:cNvPr id="35" name="Ábra 34" descr="Küldés körvonalas">
+            <a:extLst>
+              <a:ext uri="{FF2B5EF4-FFF2-40B4-BE49-F238E27FC236}">
+                <a16:creationId xmlns:a16="http://schemas.microsoft.com/office/drawing/2014/main" id="{4961E57E-3E61-840D-931B-D00482CD80F3}"/>
+              </a:ext>
+            </a:extLst>
+          </p:cNvPr>
+          <p:cNvPicPr>
+            <a:picLocks noChangeAspect="1"/>
+          </p:cNvPicPr>
+          <p:nvPr/>
+        </p:nvPicPr>
+        <p:blipFill>
+          <a:blip r:embed="rId10">
+            <a:extLst>
+              <a:ext uri="{96DAC541-7B7A-43D3-8B79-37D633B846F1}">
+                <asvg:svgBlip xmlns:asvg="http://schemas.microsoft.com/office/drawing/2016/SVG/main" r:embed="rId11"/>
+              </a:ext>
+            </a:extLst>
+          </a:blip>
+          <a:stretch>
+            <a:fillRect/>
+          </a:stretch>
+        </p:blipFill>
+        <p:spPr>
+          <a:xfrm rot="20120102" flipH="1">
+            <a:off x="2935912" y="3425621"/>
+            <a:ext cx="914400" cy="914400"/>
+          </a:xfrm>
+          <a:prstGeom prst="rect">
+            <a:avLst/>
+          </a:prstGeom>
+        </p:spPr>
+      </p:pic>
+    </p:spTree>
+    <p:extLst>
+      <p:ext uri="{BB962C8B-B14F-4D97-AF65-F5344CB8AC3E}">
+        <p14:creationId xmlns:p14="http://schemas.microsoft.com/office/powerpoint/2010/main" val="4092229551"/>
+      </p:ext>
+    </p:extLst>
+  </p:cSld>
+  <p:clrMapOvr>
+    <a:masterClrMapping/>
+  </p:clrMapOvr>
+</p:sld>
+</file>
+
+<file path=ppt/slides/slide3.xml><?xml version="1.0" encoding="utf-8"?>
+<p:sld xmlns:a="http://schemas.openxmlformats.org/drawingml/2006/main" xmlns:r="http://schemas.openxmlformats.org/officeDocument/2006/relationships" xmlns:p="http://schemas.openxmlformats.org/presentationml/2006/main">
+  <p:cSld>
+    <p:spTree>
+      <p:nvGrpSpPr>
+        <p:cNvPr id="1" name=""/>
+        <p:cNvGrpSpPr/>
+        <p:nvPr/>
+      </p:nvGrpSpPr>
+      <p:grpSpPr>
+        <a:xfrm>
+          <a:off x="0" y="0"/>
+          <a:ext cx="0" cy="0"/>
+          <a:chOff x="0" y="0"/>
+          <a:chExt cx="0" cy="0"/>
+        </a:xfrm>
+      </p:grpSpPr>
+      <p:pic>
+        <p:nvPicPr>
+          <p:cNvPr id="2" name="Ábra 1" descr="Kép egyszínű kitöltéssel">
+            <a:extLst>
+              <a:ext uri="{FF2B5EF4-FFF2-40B4-BE49-F238E27FC236}">
+                <a16:creationId xmlns:a16="http://schemas.microsoft.com/office/drawing/2014/main" id="{F3C08DDC-35A7-64C7-1DEF-77A55C95B041}"/>
+              </a:ext>
+            </a:extLst>
+          </p:cNvPr>
+          <p:cNvPicPr>
+            <a:picLocks noChangeAspect="1"/>
+          </p:cNvPicPr>
+          <p:nvPr/>
+        </p:nvPicPr>
+        <p:blipFill>
+          <a:blip r:embed="rId2">
+            <a:extLst>
+              <a:ext uri="{96DAC541-7B7A-43D3-8B79-37D633B846F1}">
+                <asvg:svgBlip xmlns:asvg="http://schemas.microsoft.com/office/drawing/2016/SVG/main" r:embed="rId3"/>
+              </a:ext>
+            </a:extLst>
+          </a:blip>
+          <a:stretch>
+            <a:fillRect/>
+          </a:stretch>
+        </p:blipFill>
+        <p:spPr>
+          <a:xfrm>
+            <a:off x="2663952" y="1418043"/>
+            <a:ext cx="914400" cy="914400"/>
+          </a:xfrm>
+          <a:prstGeom prst="rect">
+            <a:avLst/>
+          </a:prstGeom>
+        </p:spPr>
+      </p:pic>
+      <p:sp>
+        <p:nvSpPr>
+          <p:cNvPr id="3" name="Nyíl: jobbra mutató 2">
+            <a:extLst>
+              <a:ext uri="{FF2B5EF4-FFF2-40B4-BE49-F238E27FC236}">
+                <a16:creationId xmlns:a16="http://schemas.microsoft.com/office/drawing/2014/main" id="{CDCBA86B-646A-178D-6168-26FFFD3EAE13}"/>
+              </a:ext>
+            </a:extLst>
+          </p:cNvPr>
+          <p:cNvSpPr/>
+          <p:nvPr/>
+        </p:nvSpPr>
+        <p:spPr>
+          <a:xfrm>
+            <a:off x="3754755" y="1783803"/>
+            <a:ext cx="548640" cy="182880"/>
+          </a:xfrm>
+          <a:prstGeom prst="rightArrow">
+            <a:avLst/>
+          </a:prstGeom>
+          <a:solidFill>
+            <a:schemeClr val="bg2">
+              <a:lumMod val="90000"/>
+            </a:schemeClr>
+          </a:solidFill>
+        </p:spPr>
+        <p:style>
+          <a:lnRef idx="2">
+            <a:schemeClr val="accent1">
+              <a:shade val="15000"/>
+            </a:schemeClr>
+          </a:lnRef>
+          <a:fillRef idx="1">
+            <a:schemeClr val="accent1"/>
+          </a:fillRef>
+          <a:effectRef idx="0">
+            <a:schemeClr val="accent1"/>
+          </a:effectRef>
+          <a:fontRef idx="minor">
+            <a:schemeClr val="lt1"/>
+          </a:fontRef>
+        </p:style>
+        <p:txBody>
+          <a:bodyPr rtlCol="0" anchor="ctr"/>
+          <a:lstStyle/>
+          <a:p>
+            <a:pPr algn="ctr"/>
+            <a:endParaRPr lang="en-US"/>
+          </a:p>
+        </p:txBody>
+      </p:sp>
+      <p:pic>
+        <p:nvPicPr>
+          <p:cNvPr id="4" name="Ábra 3" descr="Kép egyszínű kitöltéssel">
+            <a:extLst>
+              <a:ext uri="{FF2B5EF4-FFF2-40B4-BE49-F238E27FC236}">
+                <a16:creationId xmlns:a16="http://schemas.microsoft.com/office/drawing/2014/main" id="{6E62E534-737F-75A3-3263-ADCE0BAE833C}"/>
+              </a:ext>
+            </a:extLst>
+          </p:cNvPr>
+          <p:cNvPicPr>
+            <a:picLocks noChangeAspect="1"/>
+          </p:cNvPicPr>
+          <p:nvPr/>
+        </p:nvPicPr>
+        <p:blipFill>
+          <a:blip r:embed="rId4">
+            <a:extLst>
+              <a:ext uri="{96DAC541-7B7A-43D3-8B79-37D633B846F1}">
+                <asvg:svgBlip xmlns:asvg="http://schemas.microsoft.com/office/drawing/2016/SVG/main" r:embed="rId5"/>
+              </a:ext>
+            </a:extLst>
+          </a:blip>
+          <a:stretch>
+            <a:fillRect/>
+          </a:stretch>
+        </p:blipFill>
+        <p:spPr>
+          <a:xfrm>
+            <a:off x="4379976" y="1418043"/>
+            <a:ext cx="914400" cy="914400"/>
+          </a:xfrm>
+          <a:prstGeom prst="rect">
+            <a:avLst/>
+          </a:prstGeom>
+        </p:spPr>
+      </p:pic>
+      <p:sp>
+        <p:nvSpPr>
+          <p:cNvPr id="5" name="Nyíl: jobbra mutató 4">
+            <a:extLst>
+              <a:ext uri="{FF2B5EF4-FFF2-40B4-BE49-F238E27FC236}">
+                <a16:creationId xmlns:a16="http://schemas.microsoft.com/office/drawing/2014/main" id="{D8459D3C-66E7-725A-1ED4-75D25FE87AF4}"/>
+              </a:ext>
+            </a:extLst>
+          </p:cNvPr>
+          <p:cNvSpPr/>
+          <p:nvPr/>
+        </p:nvSpPr>
+        <p:spPr>
+          <a:xfrm>
+            <a:off x="5389245" y="1783803"/>
+            <a:ext cx="548640" cy="182880"/>
+          </a:xfrm>
+          <a:prstGeom prst="rightArrow">
+            <a:avLst/>
+          </a:prstGeom>
+          <a:solidFill>
+            <a:schemeClr val="bg2">
+              <a:lumMod val="90000"/>
+            </a:schemeClr>
+          </a:solidFill>
+        </p:spPr>
+        <p:style>
+          <a:lnRef idx="2">
+            <a:schemeClr val="accent1">
+              <a:shade val="15000"/>
+            </a:schemeClr>
+          </a:lnRef>
+          <a:fillRef idx="1">
+            <a:schemeClr val="accent1"/>
+          </a:fillRef>
+          <a:effectRef idx="0">
+            <a:schemeClr val="accent1"/>
+          </a:effectRef>
+          <a:fontRef idx="minor">
+            <a:schemeClr val="lt1"/>
+          </a:fontRef>
+        </p:style>
+        <p:txBody>
+          <a:bodyPr rtlCol="0" anchor="ctr"/>
+          <a:lstStyle/>
+          <a:p>
+            <a:pPr algn="ctr"/>
+            <a:endParaRPr lang="en-US"/>
+          </a:p>
+        </p:txBody>
+      </p:sp>
+      <p:pic>
+        <p:nvPicPr>
+          <p:cNvPr id="6" name="Ábra 5" descr="Kép egyszínű kitöltéssel">
+            <a:extLst>
+              <a:ext uri="{FF2B5EF4-FFF2-40B4-BE49-F238E27FC236}">
+                <a16:creationId xmlns:a16="http://schemas.microsoft.com/office/drawing/2014/main" id="{A431E153-215A-1E9C-8709-9DA2EF26206D}"/>
+              </a:ext>
+            </a:extLst>
+          </p:cNvPr>
+          <p:cNvPicPr>
+            <a:picLocks noChangeAspect="1"/>
+          </p:cNvPicPr>
+          <p:nvPr/>
+        </p:nvPicPr>
+        <p:blipFill>
+          <a:blip r:embed="rId6">
+            <a:lum bright="10000" contrast="24000"/>
+            <a:alphaModFix amt="93000"/>
+            <a:extLst>
+              <a:ext uri="{96DAC541-7B7A-43D3-8B79-37D633B846F1}">
+                <asvg:svgBlip xmlns:asvg="http://schemas.microsoft.com/office/drawing/2016/SVG/main" r:embed="rId7"/>
+              </a:ext>
+            </a:extLst>
+          </a:blip>
+          <a:stretch>
+            <a:fillRect/>
+          </a:stretch>
+        </p:blipFill>
+        <p:spPr>
+          <a:xfrm>
+            <a:off x="6096000" y="1418043"/>
+            <a:ext cx="914400" cy="914400"/>
+          </a:xfrm>
+          <a:prstGeom prst="rect">
+            <a:avLst/>
+          </a:prstGeom>
+          <a:effectLst>
+            <a:softEdge rad="25400"/>
+          </a:effectLst>
+        </p:spPr>
+      </p:pic>
+      <p:sp>
+        <p:nvSpPr>
+          <p:cNvPr id="7" name="Nyíl: jobbra mutató 6">
+            <a:extLst>
+              <a:ext uri="{FF2B5EF4-FFF2-40B4-BE49-F238E27FC236}">
+                <a16:creationId xmlns:a16="http://schemas.microsoft.com/office/drawing/2014/main" id="{46E71BC1-60CB-1AEA-34D5-586C5F1B7C92}"/>
+              </a:ext>
+            </a:extLst>
+          </p:cNvPr>
+          <p:cNvSpPr/>
+          <p:nvPr/>
+        </p:nvSpPr>
+        <p:spPr>
+          <a:xfrm>
+            <a:off x="7124751" y="1783803"/>
+            <a:ext cx="548640" cy="182880"/>
+          </a:xfrm>
+          <a:prstGeom prst="rightArrow">
+            <a:avLst/>
+          </a:prstGeom>
+          <a:solidFill>
+            <a:schemeClr val="bg2">
+              <a:lumMod val="90000"/>
+            </a:schemeClr>
+          </a:solidFill>
+        </p:spPr>
+        <p:style>
+          <a:lnRef idx="2">
+            <a:schemeClr val="accent1">
+              <a:shade val="15000"/>
+            </a:schemeClr>
+          </a:lnRef>
+          <a:fillRef idx="1">
+            <a:schemeClr val="accent1"/>
+          </a:fillRef>
+          <a:effectRef idx="0">
+            <a:schemeClr val="accent1"/>
+          </a:effectRef>
+          <a:fontRef idx="minor">
+            <a:schemeClr val="lt1"/>
+          </a:fontRef>
+        </p:style>
+        <p:txBody>
+          <a:bodyPr rtlCol="0" anchor="ctr"/>
+          <a:lstStyle/>
+          <a:p>
+            <a:pPr algn="ctr"/>
+            <a:endParaRPr lang="en-US"/>
+          </a:p>
+        </p:txBody>
+      </p:sp>
+      <p:pic>
+        <p:nvPicPr>
+          <p:cNvPr id="8" name="Ábra 7" descr="Kép egyszínű kitöltéssel">
+            <a:extLst>
+              <a:ext uri="{FF2B5EF4-FFF2-40B4-BE49-F238E27FC236}">
+                <a16:creationId xmlns:a16="http://schemas.microsoft.com/office/drawing/2014/main" id="{2AAE243A-F79A-C18A-4D6C-7666828905DF}"/>
+              </a:ext>
+            </a:extLst>
+          </p:cNvPr>
+          <p:cNvPicPr>
+            <a:picLocks noChangeAspect="1"/>
+          </p:cNvPicPr>
+          <p:nvPr/>
+        </p:nvPicPr>
+        <p:blipFill>
+          <a:blip r:embed="rId6">
+            <a:lum bright="10000" contrast="24000"/>
+            <a:alphaModFix amt="93000"/>
+            <a:extLst>
+              <a:ext uri="{96DAC541-7B7A-43D3-8B79-37D633B846F1}">
+                <asvg:svgBlip xmlns:asvg="http://schemas.microsoft.com/office/drawing/2016/SVG/main" r:embed="rId7"/>
+              </a:ext>
+            </a:extLst>
+          </a:blip>
+          <a:stretch>
+            <a:fillRect/>
+          </a:stretch>
+        </p:blipFill>
+        <p:spPr>
+          <a:xfrm>
+            <a:off x="8040384" y="2767333"/>
+            <a:ext cx="914400" cy="914400"/>
+          </a:xfrm>
+          <a:prstGeom prst="rect">
+            <a:avLst/>
+          </a:prstGeom>
+          <a:effectLst>
+            <a:softEdge rad="25400"/>
+          </a:effectLst>
+        </p:spPr>
+      </p:pic>
+      <p:cxnSp>
+        <p:nvCxnSpPr>
+          <p:cNvPr id="9" name="Egyenes összekötő 8">
+            <a:extLst>
+              <a:ext uri="{FF2B5EF4-FFF2-40B4-BE49-F238E27FC236}">
+                <a16:creationId xmlns:a16="http://schemas.microsoft.com/office/drawing/2014/main" id="{EC46F1C4-F20A-4BB8-7EED-0A67B20B3A31}"/>
+              </a:ext>
+            </a:extLst>
+          </p:cNvPr>
+          <p:cNvCxnSpPr/>
+          <p:nvPr/>
+        </p:nvCxnSpPr>
+        <p:spPr>
+          <a:xfrm>
+            <a:off x="8770388" y="2539708"/>
+            <a:ext cx="0" cy="1545336"/>
+          </a:xfrm>
+          <a:prstGeom prst="line">
+            <a:avLst/>
+          </a:prstGeom>
+        </p:spPr>
+        <p:style>
+          <a:lnRef idx="2">
+            <a:schemeClr val="accent1"/>
+          </a:lnRef>
+          <a:fillRef idx="0">
+            <a:schemeClr val="accent1"/>
+          </a:fillRef>
+          <a:effectRef idx="1">
+            <a:schemeClr val="accent1"/>
+          </a:effectRef>
+          <a:fontRef idx="minor">
+            <a:schemeClr val="tx1"/>
+          </a:fontRef>
+        </p:style>
+      </p:cxnSp>
+      <p:cxnSp>
+        <p:nvCxnSpPr>
+          <p:cNvPr id="10" name="Egyenes összekötő 9">
+            <a:extLst>
+              <a:ext uri="{FF2B5EF4-FFF2-40B4-BE49-F238E27FC236}">
+                <a16:creationId xmlns:a16="http://schemas.microsoft.com/office/drawing/2014/main" id="{FB0DB69D-699A-C01D-F275-EEF71948A55B}"/>
+              </a:ext>
+            </a:extLst>
+          </p:cNvPr>
+          <p:cNvCxnSpPr>
+            <a:cxnSpLocks/>
+          </p:cNvCxnSpPr>
+          <p:nvPr/>
+        </p:nvCxnSpPr>
+        <p:spPr>
+          <a:xfrm flipH="1">
+            <a:off x="7866117" y="2636863"/>
+            <a:ext cx="680071" cy="1351026"/>
+          </a:xfrm>
+          <a:prstGeom prst="line">
+            <a:avLst/>
+          </a:prstGeom>
+        </p:spPr>
+        <p:style>
+          <a:lnRef idx="2">
+            <a:schemeClr val="accent1"/>
+          </a:lnRef>
+          <a:fillRef idx="0">
+            <a:schemeClr val="accent1"/>
+          </a:fillRef>
+          <a:effectRef idx="1">
+            <a:schemeClr val="accent1"/>
+          </a:effectRef>
+          <a:fontRef idx="minor">
+            <a:schemeClr val="tx1"/>
+          </a:fontRef>
+        </p:style>
+      </p:cxnSp>
+      <p:sp>
+        <p:nvSpPr>
+          <p:cNvPr id="11" name="Szövegdoboz 10">
+            <a:extLst>
+              <a:ext uri="{FF2B5EF4-FFF2-40B4-BE49-F238E27FC236}">
+                <a16:creationId xmlns:a16="http://schemas.microsoft.com/office/drawing/2014/main" id="{53754C71-FD2A-6FDC-337F-DF426210C531}"/>
+              </a:ext>
+            </a:extLst>
+          </p:cNvPr>
+          <p:cNvSpPr txBox="1"/>
+          <p:nvPr/>
+        </p:nvSpPr>
+        <p:spPr>
+          <a:xfrm>
+            <a:off x="4303395" y="2236574"/>
+            <a:ext cx="1022331" cy="338554"/>
+          </a:xfrm>
+          <a:prstGeom prst="rect">
+            <a:avLst/>
+          </a:prstGeom>
+          <a:noFill/>
+        </p:spPr>
+        <p:txBody>
+          <a:bodyPr wrap="none" rtlCol="0">
+            <a:spAutoFit/>
+          </a:bodyPr>
+          <a:lstStyle/>
+          <a:p>
+            <a:r>
+              <a:rPr lang="en-US" sz="1600" dirty="0"/>
+              <a:t>grayscale</a:t>
+            </a:r>
+          </a:p>
+        </p:txBody>
+      </p:sp>
+      <p:sp>
+        <p:nvSpPr>
+          <p:cNvPr id="12" name="Szövegdoboz 11">
+            <a:extLst>
+              <a:ext uri="{FF2B5EF4-FFF2-40B4-BE49-F238E27FC236}">
+                <a16:creationId xmlns:a16="http://schemas.microsoft.com/office/drawing/2014/main" id="{EE922A6C-9A18-B7C9-4808-5459A76BBBC7}"/>
+              </a:ext>
+            </a:extLst>
+          </p:cNvPr>
+          <p:cNvSpPr txBox="1"/>
+          <p:nvPr/>
+        </p:nvSpPr>
+        <p:spPr>
+          <a:xfrm>
+            <a:off x="6164845" y="2309357"/>
+            <a:ext cx="537327" cy="338554"/>
+          </a:xfrm>
+          <a:prstGeom prst="rect">
+            <a:avLst/>
+          </a:prstGeom>
+          <a:noFill/>
+        </p:spPr>
+        <p:txBody>
+          <a:bodyPr wrap="none" rtlCol="0">
+            <a:spAutoFit/>
+          </a:bodyPr>
+          <a:lstStyle/>
+          <a:p>
+            <a:r>
+              <a:rPr lang="en-US" sz="1600" dirty="0"/>
+              <a:t>blur</a:t>
+            </a:r>
+          </a:p>
+        </p:txBody>
+      </p:sp>
+      <p:sp>
+        <p:nvSpPr>
+          <p:cNvPr id="13" name="Szövegdoboz 12">
+            <a:extLst>
+              <a:ext uri="{FF2B5EF4-FFF2-40B4-BE49-F238E27FC236}">
+                <a16:creationId xmlns:a16="http://schemas.microsoft.com/office/drawing/2014/main" id="{C1AE8C45-F38C-11CE-8C6A-64D2F88529A8}"/>
+              </a:ext>
+            </a:extLst>
+          </p:cNvPr>
+          <p:cNvSpPr txBox="1"/>
+          <p:nvPr/>
+        </p:nvSpPr>
+        <p:spPr>
+          <a:xfrm>
+            <a:off x="9068534" y="3055256"/>
+            <a:ext cx="1506246" cy="338554"/>
+          </a:xfrm>
+          <a:prstGeom prst="rect">
+            <a:avLst/>
+          </a:prstGeom>
+          <a:noFill/>
+        </p:spPr>
+        <p:txBody>
+          <a:bodyPr wrap="none" rtlCol="0">
+            <a:spAutoFit/>
+          </a:bodyPr>
+          <a:lstStyle/>
+          <a:p>
+            <a:r>
+              <a:rPr lang="en-US" sz="1600" dirty="0"/>
+              <a:t>Edge detection</a:t>
+            </a:r>
+          </a:p>
+        </p:txBody>
+      </p:sp>
+      <p:sp>
+        <p:nvSpPr>
+          <p:cNvPr id="15" name="Szövegdoboz 14">
+            <a:extLst>
+              <a:ext uri="{FF2B5EF4-FFF2-40B4-BE49-F238E27FC236}">
+                <a16:creationId xmlns:a16="http://schemas.microsoft.com/office/drawing/2014/main" id="{47B27F03-912C-DBBC-0737-379F9E50060C}"/>
+              </a:ext>
+            </a:extLst>
+          </p:cNvPr>
+          <p:cNvSpPr txBox="1"/>
+          <p:nvPr/>
+        </p:nvSpPr>
+        <p:spPr>
+          <a:xfrm>
+            <a:off x="7812024" y="1705966"/>
+            <a:ext cx="2143536" cy="338554"/>
+          </a:xfrm>
+          <a:prstGeom prst="rect">
+            <a:avLst/>
+          </a:prstGeom>
+          <a:noFill/>
+        </p:spPr>
+        <p:txBody>
+          <a:bodyPr wrap="none" rtlCol="0">
+            <a:spAutoFit/>
+          </a:bodyPr>
+          <a:lstStyle/>
+          <a:p>
+            <a:r>
+              <a:rPr lang="en-US" sz="1600" dirty="0"/>
+              <a:t>Adaptive Thresholding</a:t>
+            </a:r>
+          </a:p>
+        </p:txBody>
+      </p:sp>
+      <p:sp>
+        <p:nvSpPr>
+          <p:cNvPr id="16" name="Nyíl: jobbra mutató 15">
+            <a:extLst>
+              <a:ext uri="{FF2B5EF4-FFF2-40B4-BE49-F238E27FC236}">
+                <a16:creationId xmlns:a16="http://schemas.microsoft.com/office/drawing/2014/main" id="{23265357-A07C-D0C3-D90B-DAF2F1BB1EDE}"/>
+              </a:ext>
+            </a:extLst>
+          </p:cNvPr>
+          <p:cNvSpPr/>
+          <p:nvPr/>
+        </p:nvSpPr>
+        <p:spPr>
+          <a:xfrm rot="5400000">
+            <a:off x="8771904" y="2241003"/>
+            <a:ext cx="548640" cy="182880"/>
+          </a:xfrm>
+          <a:prstGeom prst="rightArrow">
+            <a:avLst/>
+          </a:prstGeom>
+          <a:solidFill>
+            <a:schemeClr val="bg2">
+              <a:lumMod val="90000"/>
+            </a:schemeClr>
+          </a:solidFill>
+        </p:spPr>
+        <p:style>
+          <a:lnRef idx="2">
+            <a:schemeClr val="accent1">
+              <a:shade val="15000"/>
+            </a:schemeClr>
+          </a:lnRef>
+          <a:fillRef idx="1">
+            <a:schemeClr val="accent1"/>
+          </a:fillRef>
+          <a:effectRef idx="0">
+            <a:schemeClr val="accent1"/>
+          </a:effectRef>
+          <a:fontRef idx="minor">
+            <a:schemeClr val="lt1"/>
+          </a:fontRef>
+        </p:style>
+        <p:txBody>
+          <a:bodyPr rtlCol="0" anchor="ctr"/>
+          <a:lstStyle/>
+          <a:p>
+            <a:pPr algn="ctr"/>
+            <a:endParaRPr lang="en-US"/>
+          </a:p>
+        </p:txBody>
+      </p:sp>
+      <p:sp>
+        <p:nvSpPr>
+          <p:cNvPr id="17" name="Nyíl: jobbra mutató 16">
+            <a:extLst>
+              <a:ext uri="{FF2B5EF4-FFF2-40B4-BE49-F238E27FC236}">
+                <a16:creationId xmlns:a16="http://schemas.microsoft.com/office/drawing/2014/main" id="{5FD5B182-6D24-B9F7-D953-43924FB6B2CC}"/>
+              </a:ext>
+            </a:extLst>
+          </p:cNvPr>
+          <p:cNvSpPr/>
+          <p:nvPr/>
+        </p:nvSpPr>
+        <p:spPr>
+          <a:xfrm rot="8336970">
+            <a:off x="8069673" y="4306130"/>
+            <a:ext cx="548640" cy="182880"/>
+          </a:xfrm>
+          <a:prstGeom prst="rightArrow">
+            <a:avLst/>
+          </a:prstGeom>
+          <a:solidFill>
+            <a:schemeClr val="bg2">
+              <a:lumMod val="90000"/>
+            </a:schemeClr>
+          </a:solidFill>
+        </p:spPr>
+        <p:style>
+          <a:lnRef idx="2">
+            <a:schemeClr val="accent1">
+              <a:shade val="15000"/>
+            </a:schemeClr>
+          </a:lnRef>
+          <a:fillRef idx="1">
+            <a:schemeClr val="accent1"/>
+          </a:fillRef>
+          <a:effectRef idx="0">
+            <a:schemeClr val="accent1"/>
+          </a:effectRef>
+          <a:fontRef idx="minor">
+            <a:schemeClr val="lt1"/>
+          </a:fontRef>
+        </p:style>
+        <p:txBody>
+          <a:bodyPr rtlCol="0" anchor="ctr"/>
+          <a:lstStyle/>
+          <a:p>
+            <a:pPr algn="ctr"/>
+            <a:endParaRPr lang="en-US"/>
+          </a:p>
+        </p:txBody>
+      </p:sp>
+      <p:sp>
+        <p:nvSpPr>
+          <p:cNvPr id="18" name="Szövegdoboz 17">
+            <a:extLst>
+              <a:ext uri="{FF2B5EF4-FFF2-40B4-BE49-F238E27FC236}">
+                <a16:creationId xmlns:a16="http://schemas.microsoft.com/office/drawing/2014/main" id="{EFFEAA63-2A90-B0E3-5F90-C631BAD3224D}"/>
+              </a:ext>
+            </a:extLst>
+          </p:cNvPr>
+          <p:cNvSpPr txBox="1"/>
+          <p:nvPr/>
+        </p:nvSpPr>
+        <p:spPr>
+          <a:xfrm>
+            <a:off x="6182806" y="4613192"/>
+            <a:ext cx="2120773" cy="338554"/>
+          </a:xfrm>
+          <a:prstGeom prst="rect">
+            <a:avLst/>
+          </a:prstGeom>
+          <a:noFill/>
+        </p:spPr>
+        <p:txBody>
+          <a:bodyPr wrap="none" rtlCol="0">
+            <a:spAutoFit/>
+          </a:bodyPr>
+          <a:lstStyle/>
+          <a:p>
+            <a:r>
+              <a:rPr lang="en-US" sz="1600" dirty="0"/>
+              <a:t>Hough Line Transform</a:t>
+            </a:r>
+          </a:p>
+        </p:txBody>
+      </p:sp>
+      <p:sp>
+        <p:nvSpPr>
+          <p:cNvPr id="19" name="Nyíl: jobbra mutató 18">
+            <a:extLst>
+              <a:ext uri="{FF2B5EF4-FFF2-40B4-BE49-F238E27FC236}">
+                <a16:creationId xmlns:a16="http://schemas.microsoft.com/office/drawing/2014/main" id="{22D653F3-1753-BD30-2B98-F04195E9C31B}"/>
+              </a:ext>
+            </a:extLst>
+          </p:cNvPr>
+          <p:cNvSpPr/>
+          <p:nvPr/>
+        </p:nvSpPr>
+        <p:spPr>
+          <a:xfrm rot="11008073">
+            <a:off x="5601147" y="4647332"/>
+            <a:ext cx="548640" cy="182880"/>
+          </a:xfrm>
+          <a:prstGeom prst="rightArrow">
+            <a:avLst/>
+          </a:prstGeom>
+          <a:solidFill>
+            <a:schemeClr val="bg2">
+              <a:lumMod val="90000"/>
+            </a:schemeClr>
+          </a:solidFill>
+        </p:spPr>
+        <p:style>
+          <a:lnRef idx="2">
+            <a:schemeClr val="accent1">
+              <a:shade val="15000"/>
+            </a:schemeClr>
+          </a:lnRef>
+          <a:fillRef idx="1">
+            <a:schemeClr val="accent1"/>
+          </a:fillRef>
+          <a:effectRef idx="0">
+            <a:schemeClr val="accent1"/>
+          </a:effectRef>
+          <a:fontRef idx="minor">
+            <a:schemeClr val="lt1"/>
+          </a:fontRef>
+        </p:style>
+        <p:txBody>
+          <a:bodyPr rtlCol="0" anchor="ctr"/>
+          <a:lstStyle/>
+          <a:p>
+            <a:pPr algn="ctr"/>
+            <a:endParaRPr lang="en-US"/>
+          </a:p>
+        </p:txBody>
+      </p:sp>
+      <p:sp>
+        <p:nvSpPr>
+          <p:cNvPr id="20" name="Szövegdoboz 19">
+            <a:extLst>
+              <a:ext uri="{FF2B5EF4-FFF2-40B4-BE49-F238E27FC236}">
+                <a16:creationId xmlns:a16="http://schemas.microsoft.com/office/drawing/2014/main" id="{14F9AB66-01CB-3556-4D31-1E3CF92F415C}"/>
+              </a:ext>
+            </a:extLst>
+          </p:cNvPr>
+          <p:cNvSpPr txBox="1"/>
+          <p:nvPr/>
+        </p:nvSpPr>
+        <p:spPr>
+          <a:xfrm>
+            <a:off x="3588662" y="4951746"/>
+            <a:ext cx="2282741" cy="338554"/>
+          </a:xfrm>
+          <a:prstGeom prst="rect">
+            <a:avLst/>
+          </a:prstGeom>
+          <a:noFill/>
+        </p:spPr>
+        <p:txBody>
+          <a:bodyPr wrap="none" rtlCol="0">
+            <a:spAutoFit/>
+          </a:bodyPr>
+          <a:lstStyle/>
+          <a:p>
+            <a:r>
+              <a:rPr lang="en-US" sz="1600" dirty="0"/>
+              <a:t>Merge the colinear lines</a:t>
+            </a:r>
+          </a:p>
+        </p:txBody>
+      </p:sp>
+      <p:pic>
+        <p:nvPicPr>
+          <p:cNvPr id="22" name="Ábra 21" descr="Diagram elágazással egyszínű kitöltéssel">
+            <a:extLst>
+              <a:ext uri="{FF2B5EF4-FFF2-40B4-BE49-F238E27FC236}">
+                <a16:creationId xmlns:a16="http://schemas.microsoft.com/office/drawing/2014/main" id="{1D9AC6C6-62C1-5986-90FA-56291D2831C8}"/>
+              </a:ext>
+            </a:extLst>
+          </p:cNvPr>
+          <p:cNvPicPr>
+            <a:picLocks noChangeAspect="1"/>
+          </p:cNvPicPr>
+          <p:nvPr/>
+        </p:nvPicPr>
+        <p:blipFill>
+          <a:blip r:embed="rId8">
+            <a:extLst>
+              <a:ext uri="{96DAC541-7B7A-43D3-8B79-37D633B846F1}">
+                <asvg:svgBlip xmlns:asvg="http://schemas.microsoft.com/office/drawing/2016/SVG/main" r:embed="rId9"/>
+              </a:ext>
+            </a:extLst>
+          </a:blip>
+          <a:stretch>
+            <a:fillRect/>
+          </a:stretch>
+        </p:blipFill>
+        <p:spPr>
+          <a:xfrm>
+            <a:off x="4252331" y="4037346"/>
+            <a:ext cx="914400" cy="914400"/>
+          </a:xfrm>
+          <a:prstGeom prst="rect">
+            <a:avLst/>
+          </a:prstGeom>
+        </p:spPr>
+      </p:pic>
+      <p:sp>
+        <p:nvSpPr>
+          <p:cNvPr id="23" name="Nyíl: jobbra mutató 22">
+            <a:extLst>
+              <a:ext uri="{FF2B5EF4-FFF2-40B4-BE49-F238E27FC236}">
+                <a16:creationId xmlns:a16="http://schemas.microsoft.com/office/drawing/2014/main" id="{EDE79CB4-FB70-FAD8-8289-74F414AD570C}"/>
+              </a:ext>
+            </a:extLst>
+          </p:cNvPr>
+          <p:cNvSpPr/>
+          <p:nvPr/>
+        </p:nvSpPr>
+        <p:spPr>
+          <a:xfrm rot="11824172">
+            <a:off x="3357099" y="4251861"/>
+            <a:ext cx="548640" cy="182880"/>
+          </a:xfrm>
+          <a:prstGeom prst="rightArrow">
+            <a:avLst/>
+          </a:prstGeom>
+          <a:solidFill>
+            <a:schemeClr val="bg2">
+              <a:lumMod val="90000"/>
+            </a:schemeClr>
+          </a:solidFill>
+        </p:spPr>
+        <p:style>
+          <a:lnRef idx="2">
+            <a:schemeClr val="accent1">
+              <a:shade val="15000"/>
+            </a:schemeClr>
+          </a:lnRef>
+          <a:fillRef idx="1">
+            <a:schemeClr val="accent1"/>
+          </a:fillRef>
+          <a:effectRef idx="0">
+            <a:schemeClr val="accent1"/>
+          </a:effectRef>
+          <a:fontRef idx="minor">
+            <a:schemeClr val="lt1"/>
+          </a:fontRef>
+        </p:style>
+        <p:txBody>
+          <a:bodyPr rtlCol="0" anchor="ctr"/>
+          <a:lstStyle/>
+          <a:p>
+            <a:pPr algn="ctr"/>
+            <a:endParaRPr lang="en-US"/>
+          </a:p>
+        </p:txBody>
+      </p:sp>
+      <p:pic>
+        <p:nvPicPr>
+          <p:cNvPr id="24" name="Ábra 23" descr="Küldés körvonalas">
+            <a:extLst>
+              <a:ext uri="{FF2B5EF4-FFF2-40B4-BE49-F238E27FC236}">
+                <a16:creationId xmlns:a16="http://schemas.microsoft.com/office/drawing/2014/main" id="{6A4597AE-E249-B447-454B-994FBFB02571}"/>
+              </a:ext>
+            </a:extLst>
+          </p:cNvPr>
+          <p:cNvPicPr>
+            <a:picLocks noChangeAspect="1"/>
+          </p:cNvPicPr>
+          <p:nvPr/>
+        </p:nvPicPr>
+        <p:blipFill>
+          <a:blip r:embed="rId10">
+            <a:extLst>
+              <a:ext uri="{96DAC541-7B7A-43D3-8B79-37D633B846F1}">
+                <asvg:svgBlip xmlns:asvg="http://schemas.microsoft.com/office/drawing/2016/SVG/main" r:embed="rId11"/>
+              </a:ext>
+            </a:extLst>
+          </a:blip>
+          <a:stretch>
+            <a:fillRect/>
+          </a:stretch>
+        </p:blipFill>
+        <p:spPr>
+          <a:xfrm rot="20120102" flipH="1">
+            <a:off x="2054662" y="3379784"/>
+            <a:ext cx="914400" cy="914400"/>
+          </a:xfrm>
+          <a:prstGeom prst="rect">
+            <a:avLst/>
+          </a:prstGeom>
+        </p:spPr>
+      </p:pic>
+    </p:spTree>
+    <p:extLst>
+      <p:ext uri="{BB962C8B-B14F-4D97-AF65-F5344CB8AC3E}">
+        <p14:creationId xmlns:p14="http://schemas.microsoft.com/office/powerpoint/2010/main" val="2396342860"/>
       </p:ext>
     </p:extLst>
   </p:cSld>

</xml_diff>